<commit_message>
Updated Class 29 for edition 0523
</commit_message>
<xml_diff>
--- a/Modulo_3/Clases/Clase_Semana_29_CDSS/Brain PET and MRI processing.pptx
+++ b/Modulo_3/Clases/Clase_Semana_29_CDSS/Brain PET and MRI processing.pptx
@@ -6,12 +6,11 @@
   </p:sldMasterIdLst>
   <p:sldIdLst>
     <p:sldId id="268" r:id="rId2"/>
-    <p:sldId id="463" r:id="rId3"/>
-    <p:sldId id="464" r:id="rId4"/>
-    <p:sldId id="461" r:id="rId5"/>
-    <p:sldId id="482" r:id="rId6"/>
-    <p:sldId id="478" r:id="rId7"/>
-    <p:sldId id="481" r:id="rId8"/>
+    <p:sldId id="461" r:id="rId3"/>
+    <p:sldId id="482" r:id="rId4"/>
+    <p:sldId id="478" r:id="rId5"/>
+    <p:sldId id="463" r:id="rId6"/>
+    <p:sldId id="464" r:id="rId7"/>
   </p:sldIdLst>
   <p:sldSz cx="12192000" cy="6858000"/>
   <p:notesSz cx="6858000" cy="9144000"/>
@@ -276,7 +275,7 @@
           <a:p>
             <a:fld id="{655A5808-3B61-48CC-92EF-85AC2E0DFA56}" type="datetime2">
               <a:rPr lang="en-US" smtClean="0"/>
-              <a:t>Monday, October 16, 2023</a:t>
+              <a:t>Tuesday, December 19, 2023</a:t>
             </a:fld>
             <a:endParaRPr lang="en-US"/>
           </a:p>
@@ -474,7 +473,7 @@
           <a:p>
             <a:fld id="{735E98AF-4574-4509-BF7A-519ACD5BF826}" type="datetime2">
               <a:rPr lang="en-US" smtClean="0"/>
-              <a:t>Monday, October 16, 2023</a:t>
+              <a:t>Tuesday, December 19, 2023</a:t>
             </a:fld>
             <a:endParaRPr lang="en-US"/>
           </a:p>
@@ -684,7 +683,7 @@
           <a:p>
             <a:fld id="{93DD97D4-9636-490F-85D0-E926C2B6F3B1}" type="datetime2">
               <a:rPr lang="en-US" smtClean="0"/>
-              <a:t>Monday, October 16, 2023</a:t>
+              <a:t>Tuesday, December 19, 2023</a:t>
             </a:fld>
             <a:endParaRPr lang="en-US"/>
           </a:p>
@@ -883,7 +882,7 @@
           <a:p>
             <a:fld id="{2F3AF3C6-0FD4-4939-991C-00DDE5C56815}" type="datetime2">
               <a:rPr lang="en-US" smtClean="0"/>
-              <a:t>Monday, October 16, 2023</a:t>
+              <a:t>Tuesday, December 19, 2023</a:t>
             </a:fld>
             <a:endParaRPr lang="en-US"/>
           </a:p>
@@ -1164,7 +1163,7 @@
           <a:p>
             <a:fld id="{86807482-8128-47C6-A8DD-6452B0291CFF}" type="datetime2">
               <a:rPr lang="en-US" smtClean="0"/>
-              <a:t>Monday, October 16, 2023</a:t>
+              <a:t>Tuesday, December 19, 2023</a:t>
             </a:fld>
             <a:endParaRPr lang="en-US"/>
           </a:p>
@@ -1432,7 +1431,7 @@
           <a:p>
             <a:fld id="{37903F25-275E-41DE-BE3B-EBF0DB49F9B1}" type="datetime2">
               <a:rPr lang="en-US" smtClean="0"/>
-              <a:t>Monday, October 16, 2023</a:t>
+              <a:t>Tuesday, December 19, 2023</a:t>
             </a:fld>
             <a:endParaRPr lang="en-US"/>
           </a:p>
@@ -1813,7 +1812,7 @@
           <a:p>
             <a:fld id="{EE475572-4A44-4171-84AA-64D42C8050A6}" type="datetime2">
               <a:rPr lang="en-US" smtClean="0"/>
-              <a:t>Monday, October 16, 2023</a:t>
+              <a:t>Tuesday, December 19, 2023</a:t>
             </a:fld>
             <a:endParaRPr lang="en-US"/>
           </a:p>
@@ -1983,7 +1982,7 @@
           <a:p>
             <a:fld id="{C4C1612E-528E-4FD5-9E9E-E15F1108F171}" type="datetime2">
               <a:rPr lang="en-US" smtClean="0"/>
-              <a:t>Monday, October 16, 2023</a:t>
+              <a:t>Tuesday, December 19, 2023</a:t>
             </a:fld>
             <a:endParaRPr lang="en-US"/>
           </a:p>
@@ -2096,7 +2095,7 @@
           <a:p>
             <a:fld id="{D4F6D862-A06D-436F-A92E-EBAAD50B6E50}" type="datetime2">
               <a:rPr lang="en-US" smtClean="0"/>
-              <a:t>Monday, October 16, 2023</a:t>
+              <a:t>Tuesday, December 19, 2023</a:t>
             </a:fld>
             <a:endParaRPr lang="en-US"/>
           </a:p>
@@ -2413,7 +2412,7 @@
           <a:p>
             <a:fld id="{B73E0B7D-2260-4809-8F0A-9E5F3E24F169}" type="datetime2">
               <a:rPr lang="en-US" smtClean="0"/>
-              <a:t>Monday, October 16, 2023</a:t>
+              <a:t>Tuesday, December 19, 2023</a:t>
             </a:fld>
             <a:endParaRPr lang="en-US"/>
           </a:p>
@@ -2705,7 +2704,7 @@
           <a:p>
             <a:fld id="{3C8E4735-C637-46A3-94EB-AB3AC4188D2F}" type="datetime2">
               <a:rPr lang="en-US" smtClean="0"/>
-              <a:t>Monday, October 16, 2023</a:t>
+              <a:t>Tuesday, December 19, 2023</a:t>
             </a:fld>
             <a:endParaRPr lang="en-US"/>
           </a:p>
@@ -3073,7 +3072,7 @@
             <a:fld id="{AE0C963C-C1DB-4AFD-9DDC-0691666BF49B}" type="datetime2">
               <a:rPr lang="en-US" smtClean="0"/>
               <a:pPr/>
-              <a:t>Monday, October 16, 2023</a:t>
+              <a:t>Tuesday, December 19, 2023</a:t>
             </a:fld>
             <a:endParaRPr lang="en-US" cap="all" dirty="0"/>
           </a:p>
@@ -10455,7 +10454,7 @@
           <p:cNvPr id="2" name="Título 1">
             <a:extLst>
               <a:ext uri="{FF2B5EF4-FFF2-40B4-BE49-F238E27FC236}">
-                <a16:creationId xmlns:a16="http://schemas.microsoft.com/office/drawing/2014/main" id="{8AFDB66D-3D0E-281D-8A93-DA6E42FF540D}"/>
+                <a16:creationId xmlns:a16="http://schemas.microsoft.com/office/drawing/2014/main" id="{FBB01069-074F-AF35-AAF9-00C4260CFF47}"/>
               </a:ext>
             </a:extLst>
           </p:cNvPr>
@@ -10468,135 +10467,63 @@
         </p:nvSpPr>
         <p:spPr>
           <a:xfrm>
-            <a:off x="618008" y="499135"/>
-            <a:ext cx="10730010" cy="705350"/>
-          </a:xfrm>
-        </p:spPr>
-        <p:txBody>
-          <a:bodyPr>
-            <a:normAutofit/>
-          </a:bodyPr>
+            <a:off x="975360" y="795528"/>
+            <a:ext cx="10241280" cy="667512"/>
+          </a:xfrm>
+        </p:spPr>
+        <p:txBody>
+          <a:bodyPr/>
           <a:lstStyle/>
           <a:p>
             <a:r>
               <a:rPr lang="es-ES" dirty="0"/>
-              <a:t>SPM</a:t>
-            </a:r>
-          </a:p>
-        </p:txBody>
-      </p:sp>
-      <p:sp>
-        <p:nvSpPr>
-          <p:cNvPr id="3" name="CuadroTexto 2">
-            <a:extLst>
-              <a:ext uri="{FF2B5EF4-FFF2-40B4-BE49-F238E27FC236}">
-                <a16:creationId xmlns:a16="http://schemas.microsoft.com/office/drawing/2014/main" id="{38494EC1-9A0C-CF2C-036A-4491745AEEB1}"/>
-              </a:ext>
-            </a:extLst>
-          </p:cNvPr>
-          <p:cNvSpPr txBox="1"/>
-          <p:nvPr/>
-        </p:nvSpPr>
+              <a:t>IMAGEN PET</a:t>
+            </a:r>
+          </a:p>
+        </p:txBody>
+      </p:sp>
+      <p:pic>
+        <p:nvPicPr>
+          <p:cNvPr id="17" name="Imagen 16" descr="Escala de tiempo&#10;&#10;Descripción generada automáticamente">
+            <a:extLst>
+              <a:ext uri="{FF2B5EF4-FFF2-40B4-BE49-F238E27FC236}">
+                <a16:creationId xmlns:a16="http://schemas.microsoft.com/office/drawing/2014/main" id="{B81CF3CA-92C2-B5ED-EB38-3FAED9A61D96}"/>
+              </a:ext>
+            </a:extLst>
+          </p:cNvPr>
+          <p:cNvPicPr>
+            <a:picLocks noChangeAspect="1"/>
+          </p:cNvPicPr>
+          <p:nvPr/>
+        </p:nvPicPr>
+        <p:blipFill>
+          <a:blip r:embed="rId2">
+            <a:extLst>
+              <a:ext uri="{28A0092B-C50C-407E-A947-70E740481C1C}">
+                <a14:useLocalDpi xmlns:a14="http://schemas.microsoft.com/office/drawing/2010/main" val="0"/>
+              </a:ext>
+            </a:extLst>
+          </a:blip>
+          <a:stretch>
+            <a:fillRect/>
+          </a:stretch>
+        </p:blipFill>
         <p:spPr>
           <a:xfrm>
-            <a:off x="627829" y="1456676"/>
-            <a:ext cx="6358525" cy="1477328"/>
+            <a:off x="975360" y="1828131"/>
+            <a:ext cx="5467350" cy="3952875"/>
           </a:xfrm>
           <a:prstGeom prst="rect">
             <a:avLst/>
           </a:prstGeom>
-          <a:noFill/>
-        </p:spPr>
-        <p:txBody>
-          <a:bodyPr wrap="square" rtlCol="0">
-            <a:spAutoFit/>
-          </a:bodyPr>
-          <a:lstStyle/>
-          <a:p>
-            <a:pPr marL="285750" indent="-285750">
-              <a:buFont typeface="Arial" panose="020B0604020202020204" pitchFamily="34" charset="0"/>
-              <a:buChar char="•"/>
-            </a:pPr>
-            <a:r>
-              <a:rPr lang="es-ES" dirty="0"/>
-              <a:t>Software fundamental para cuantificación en neuroimagen</a:t>
-            </a:r>
-          </a:p>
-          <a:p>
-            <a:pPr marL="285750" indent="-285750">
-              <a:buFont typeface="Arial" panose="020B0604020202020204" pitchFamily="34" charset="0"/>
-              <a:buChar char="•"/>
-            </a:pPr>
-            <a:r>
-              <a:rPr lang="es-ES" dirty="0" err="1"/>
-              <a:t>Toolbox</a:t>
-            </a:r>
-            <a:r>
-              <a:rPr lang="es-ES" dirty="0"/>
-              <a:t> de Matlab (versión </a:t>
-            </a:r>
-            <a:r>
-              <a:rPr lang="es-ES" dirty="0" err="1"/>
-              <a:t>standalone</a:t>
-            </a:r>
-            <a:r>
-              <a:rPr lang="es-ES" dirty="0"/>
-              <a:t>)</a:t>
-            </a:r>
-          </a:p>
-          <a:p>
-            <a:pPr marL="285750" indent="-285750">
-              <a:buFont typeface="Arial" panose="020B0604020202020204" pitchFamily="34" charset="0"/>
-              <a:buChar char="•"/>
-            </a:pPr>
-            <a:r>
-              <a:rPr lang="es-ES" dirty="0"/>
-              <a:t>Se puede ampliar con </a:t>
-            </a:r>
-            <a:r>
-              <a:rPr lang="es-ES" dirty="0" err="1"/>
-              <a:t>toolbox</a:t>
-            </a:r>
-            <a:r>
-              <a:rPr lang="es-ES" dirty="0"/>
-              <a:t> adicionales</a:t>
-            </a:r>
-          </a:p>
-          <a:p>
-            <a:pPr marL="285750" indent="-285750">
-              <a:buFont typeface="Arial" panose="020B0604020202020204" pitchFamily="34" charset="0"/>
-              <a:buChar char="•"/>
-            </a:pPr>
-            <a:r>
-              <a:rPr lang="es-ES" dirty="0"/>
-              <a:t>Página web: </a:t>
-            </a:r>
-            <a:r>
-              <a:rPr lang="es-ES" dirty="0">
-                <a:hlinkClick r:id="rId2"/>
-              </a:rPr>
-              <a:t>https://www.fil.ion.ucl.ac.uk/spm/</a:t>
-            </a:r>
-            <a:r>
-              <a:rPr lang="es-ES" dirty="0"/>
-              <a:t> </a:t>
-            </a:r>
-          </a:p>
-          <a:p>
-            <a:pPr marL="285750" indent="-285750">
-              <a:buFont typeface="Arial" panose="020B0604020202020204" pitchFamily="34" charset="0"/>
-              <a:buChar char="•"/>
-            </a:pPr>
-            <a:endParaRPr lang="es-ES" dirty="0"/>
-          </a:p>
-        </p:txBody>
-      </p:sp>
+        </p:spPr>
+      </p:pic>
       <p:pic>
         <p:nvPicPr>
-          <p:cNvPr id="7" name="Imagen 6">
-            <a:extLst>
-              <a:ext uri="{FF2B5EF4-FFF2-40B4-BE49-F238E27FC236}">
-                <a16:creationId xmlns:a16="http://schemas.microsoft.com/office/drawing/2014/main" id="{4CF457C8-5F51-3CFB-1399-09E9D18BF30E}"/>
+          <p:cNvPr id="19" name="Imagen 18">
+            <a:extLst>
+              <a:ext uri="{FF2B5EF4-FFF2-40B4-BE49-F238E27FC236}">
+                <a16:creationId xmlns:a16="http://schemas.microsoft.com/office/drawing/2014/main" id="{4DC42CBE-10FB-4669-2F2E-DA1C9CA062A4}"/>
               </a:ext>
             </a:extLst>
           </p:cNvPr>
@@ -10613,20 +10540,114 @@
         </p:blipFill>
         <p:spPr>
           <a:xfrm>
-            <a:off x="1096847" y="2963726"/>
-            <a:ext cx="4999153" cy="3139712"/>
+            <a:off x="3363053" y="5327663"/>
+            <a:ext cx="3079657" cy="906685"/>
           </a:xfrm>
           <a:prstGeom prst="rect">
             <a:avLst/>
           </a:prstGeom>
         </p:spPr>
       </p:pic>
+      <p:sp>
+        <p:nvSpPr>
+          <p:cNvPr id="21" name="CuadroTexto 20">
+            <a:extLst>
+              <a:ext uri="{FF2B5EF4-FFF2-40B4-BE49-F238E27FC236}">
+                <a16:creationId xmlns:a16="http://schemas.microsoft.com/office/drawing/2014/main" id="{738325D2-2D19-198B-B5C2-4A3483E005C5}"/>
+              </a:ext>
+            </a:extLst>
+          </p:cNvPr>
+          <p:cNvSpPr txBox="1"/>
+          <p:nvPr/>
+        </p:nvSpPr>
+        <p:spPr>
+          <a:xfrm>
+            <a:off x="7092247" y="1928361"/>
+            <a:ext cx="4612071" cy="1754326"/>
+          </a:xfrm>
+          <a:prstGeom prst="rect">
+            <a:avLst/>
+          </a:prstGeom>
+          <a:noFill/>
+        </p:spPr>
+        <p:txBody>
+          <a:bodyPr wrap="square">
+            <a:spAutoFit/>
+          </a:bodyPr>
+          <a:lstStyle/>
+          <a:p>
+            <a:r>
+              <a:rPr lang="es-ES" b="0" i="0" dirty="0">
+                <a:solidFill>
+                  <a:srgbClr val="202122"/>
+                </a:solidFill>
+                <a:effectLst/>
+                <a:latin typeface="Arial" panose="020B0604020202020204" pitchFamily="34" charset="0"/>
+              </a:rPr>
+              <a:t>Utiliza sustancias radiactivas conocidas como </a:t>
+            </a:r>
+            <a:r>
+              <a:rPr lang="es-ES" b="0" i="0" u="none" strike="noStrike" dirty="0" err="1">
+                <a:solidFill>
+                  <a:srgbClr val="3366CC"/>
+                </a:solidFill>
+                <a:effectLst/>
+                <a:latin typeface="Arial" panose="020B0604020202020204" pitchFamily="34" charset="0"/>
+                <a:hlinkClick r:id="rId4" tooltip="Radiotracer"/>
+              </a:rPr>
+              <a:t>radiotrazadores</a:t>
+            </a:r>
+            <a:r>
+              <a:rPr lang="es-ES" b="0" i="0" dirty="0">
+                <a:solidFill>
+                  <a:srgbClr val="202122"/>
+                </a:solidFill>
+                <a:effectLst/>
+                <a:latin typeface="Arial" panose="020B0604020202020204" pitchFamily="34" charset="0"/>
+              </a:rPr>
+              <a:t> para visualizar y medir actividad y cambios en </a:t>
+            </a:r>
+            <a:r>
+              <a:rPr lang="es-ES" b="0" i="0" u="none" strike="noStrike" dirty="0">
+                <a:solidFill>
+                  <a:srgbClr val="3366CC"/>
+                </a:solidFill>
+                <a:effectLst/>
+                <a:latin typeface="Arial" panose="020B0604020202020204" pitchFamily="34" charset="0"/>
+                <a:hlinkClick r:id="rId5" tooltip="Metabolism"/>
+              </a:rPr>
+              <a:t>los procesos </a:t>
+            </a:r>
+            <a:r>
+              <a:rPr lang="es-ES" b="0" i="0" u="none" strike="noStrike" dirty="0">
+                <a:solidFill>
+                  <a:srgbClr val="3366CC"/>
+                </a:solidFill>
+                <a:effectLst/>
+                <a:latin typeface="Arial" panose="020B0604020202020204" pitchFamily="34" charset="0"/>
+              </a:rPr>
+              <a:t>moleculares.</a:t>
+            </a:r>
+          </a:p>
+          <a:p>
+            <a:endParaRPr lang="es-ES" dirty="0">
+              <a:solidFill>
+                <a:srgbClr val="3366CC"/>
+              </a:solidFill>
+              <a:latin typeface="Arial" panose="020B0604020202020204" pitchFamily="34" charset="0"/>
+            </a:endParaRPr>
+          </a:p>
+          <a:p>
+            <a:endParaRPr lang="es-ES" dirty="0"/>
+          </a:p>
+        </p:txBody>
+      </p:sp>
       <p:pic>
         <p:nvPicPr>
-          <p:cNvPr id="9" name="Imagen 8">
-            <a:extLst>
-              <a:ext uri="{FF2B5EF4-FFF2-40B4-BE49-F238E27FC236}">
-                <a16:creationId xmlns:a16="http://schemas.microsoft.com/office/drawing/2014/main" id="{68D5730F-A420-6660-A7A2-5CC9C00E4406}"/>
+          <p:cNvPr id="23" name="Imagen 22" descr="Imagen de la pantalla de un video juego&#10;&#10;Descripción generada automáticamente con confianza baja">
+            <a:extLst>
+              <a:ext uri="{FF2B5EF4-FFF2-40B4-BE49-F238E27FC236}">
+                <a16:creationId xmlns:a16="http://schemas.microsoft.com/office/drawing/2014/main" id="{1683DB95-29CF-0954-98FD-09546A93C875}"/>
               </a:ext>
             </a:extLst>
           </p:cNvPr>
@@ -10636,345 +10657,31 @@
           <p:nvPr/>
         </p:nvPicPr>
         <p:blipFill>
-          <a:blip r:embed="rId4"/>
+          <a:blip r:embed="rId6">
+            <a:extLst>
+              <a:ext uri="{28A0092B-C50C-407E-A947-70E740481C1C}">
+                <a14:useLocalDpi xmlns:a14="http://schemas.microsoft.com/office/drawing/2010/main" val="0"/>
+              </a:ext>
+            </a:extLst>
+          </a:blip>
           <a:stretch>
             <a:fillRect/>
           </a:stretch>
         </p:blipFill>
         <p:spPr>
           <a:xfrm>
-            <a:off x="6986354" y="1035699"/>
-            <a:ext cx="4587638" cy="5067739"/>
+            <a:off x="7625044" y="3431280"/>
+            <a:ext cx="3546479" cy="2349725"/>
           </a:xfrm>
           <a:prstGeom prst="rect">
             <a:avLst/>
           </a:prstGeom>
         </p:spPr>
       </p:pic>
-      <p:sp>
-        <p:nvSpPr>
-          <p:cNvPr id="10" name="Rectángulo 9">
-            <a:extLst>
-              <a:ext uri="{FF2B5EF4-FFF2-40B4-BE49-F238E27FC236}">
-                <a16:creationId xmlns:a16="http://schemas.microsoft.com/office/drawing/2014/main" id="{54ADBBAE-3319-A798-DAF0-2E617B4FDF4E}"/>
-              </a:ext>
-            </a:extLst>
-          </p:cNvPr>
-          <p:cNvSpPr/>
-          <p:nvPr/>
-        </p:nvSpPr>
-        <p:spPr>
-          <a:xfrm>
-            <a:off x="2440501" y="4962986"/>
-            <a:ext cx="1072055" cy="372066"/>
-          </a:xfrm>
-          <a:prstGeom prst="rect">
-            <a:avLst/>
-          </a:prstGeom>
-          <a:noFill/>
-          <a:ln w="28575" cap="flat" cmpd="sng" algn="ctr">
-            <a:solidFill>
-              <a:schemeClr val="accent2"/>
-            </a:solidFill>
-            <a:prstDash val="solid"/>
-            <a:round/>
-            <a:headEnd type="none" w="med" len="med"/>
-            <a:tailEnd type="none" w="med" len="med"/>
-          </a:ln>
-        </p:spPr>
-        <p:style>
-          <a:lnRef idx="0">
-            <a:scrgbClr r="0" g="0" b="0"/>
-          </a:lnRef>
-          <a:fillRef idx="0">
-            <a:scrgbClr r="0" g="0" b="0"/>
-          </a:fillRef>
-          <a:effectRef idx="0">
-            <a:scrgbClr r="0" g="0" b="0"/>
-          </a:effectRef>
-          <a:fontRef idx="minor">
-            <a:schemeClr val="accent2"/>
-          </a:fontRef>
-        </p:style>
-        <p:txBody>
-          <a:bodyPr rtlCol="0" anchor="ctr"/>
-          <a:lstStyle/>
-          <a:p>
-            <a:pPr algn="ctr"/>
-            <a:endParaRPr lang="es-ES"/>
-          </a:p>
-        </p:txBody>
-      </p:sp>
-      <p:sp>
-        <p:nvSpPr>
-          <p:cNvPr id="11" name="Rectángulo 10">
-            <a:extLst>
-              <a:ext uri="{FF2B5EF4-FFF2-40B4-BE49-F238E27FC236}">
-                <a16:creationId xmlns:a16="http://schemas.microsoft.com/office/drawing/2014/main" id="{48A20834-92E4-38FD-D009-14E800128AFC}"/>
-              </a:ext>
-            </a:extLst>
-          </p:cNvPr>
-          <p:cNvSpPr/>
-          <p:nvPr/>
-        </p:nvSpPr>
-        <p:spPr>
-          <a:xfrm>
-            <a:off x="7226913" y="1734207"/>
-            <a:ext cx="1336916" cy="384679"/>
-          </a:xfrm>
-          <a:prstGeom prst="rect">
-            <a:avLst/>
-          </a:prstGeom>
-          <a:noFill/>
-          <a:ln w="28575" cap="flat" cmpd="sng" algn="ctr">
-            <a:solidFill>
-              <a:schemeClr val="accent4"/>
-            </a:solidFill>
-            <a:prstDash val="solid"/>
-            <a:round/>
-            <a:headEnd type="none" w="med" len="med"/>
-            <a:tailEnd type="none" w="med" len="med"/>
-          </a:ln>
-        </p:spPr>
-        <p:style>
-          <a:lnRef idx="0">
-            <a:scrgbClr r="0" g="0" b="0"/>
-          </a:lnRef>
-          <a:fillRef idx="0">
-            <a:scrgbClr r="0" g="0" b="0"/>
-          </a:fillRef>
-          <a:effectRef idx="0">
-            <a:scrgbClr r="0" g="0" b="0"/>
-          </a:effectRef>
-          <a:fontRef idx="minor">
-            <a:schemeClr val="accent4"/>
-          </a:fontRef>
-        </p:style>
-        <p:txBody>
-          <a:bodyPr rtlCol="0" anchor="ctr"/>
-          <a:lstStyle/>
-          <a:p>
-            <a:pPr algn="ctr"/>
-            <a:endParaRPr lang="es-ES"/>
-          </a:p>
-        </p:txBody>
-      </p:sp>
-      <p:sp>
-        <p:nvSpPr>
-          <p:cNvPr id="12" name="Rectángulo 11">
-            <a:extLst>
-              <a:ext uri="{FF2B5EF4-FFF2-40B4-BE49-F238E27FC236}">
-                <a16:creationId xmlns:a16="http://schemas.microsoft.com/office/drawing/2014/main" id="{553111CE-1A2E-7D54-5F7E-F5C56671EDA1}"/>
-              </a:ext>
-            </a:extLst>
-          </p:cNvPr>
-          <p:cNvSpPr/>
-          <p:nvPr/>
-        </p:nvSpPr>
-        <p:spPr>
-          <a:xfrm>
-            <a:off x="8614279" y="1538714"/>
-            <a:ext cx="1292772" cy="384679"/>
-          </a:xfrm>
-          <a:prstGeom prst="rect">
-            <a:avLst/>
-          </a:prstGeom>
-          <a:noFill/>
-          <a:ln w="28575" cap="flat" cmpd="sng" algn="ctr">
-            <a:solidFill>
-              <a:schemeClr val="accent6"/>
-            </a:solidFill>
-            <a:prstDash val="solid"/>
-            <a:round/>
-            <a:headEnd type="none" w="med" len="med"/>
-            <a:tailEnd type="none" w="med" len="med"/>
-          </a:ln>
-        </p:spPr>
-        <p:style>
-          <a:lnRef idx="0">
-            <a:scrgbClr r="0" g="0" b="0"/>
-          </a:lnRef>
-          <a:fillRef idx="0">
-            <a:scrgbClr r="0" g="0" b="0"/>
-          </a:fillRef>
-          <a:effectRef idx="0">
-            <a:scrgbClr r="0" g="0" b="0"/>
-          </a:effectRef>
-          <a:fontRef idx="minor">
-            <a:schemeClr val="accent6"/>
-          </a:fontRef>
-        </p:style>
-        <p:txBody>
-          <a:bodyPr rtlCol="0" anchor="ctr"/>
-          <a:lstStyle/>
-          <a:p>
-            <a:pPr algn="ctr"/>
-            <a:endParaRPr lang="es-ES"/>
-          </a:p>
-        </p:txBody>
-      </p:sp>
-      <p:sp>
-        <p:nvSpPr>
-          <p:cNvPr id="13" name="Rectángulo 12">
-            <a:extLst>
-              <a:ext uri="{FF2B5EF4-FFF2-40B4-BE49-F238E27FC236}">
-                <a16:creationId xmlns:a16="http://schemas.microsoft.com/office/drawing/2014/main" id="{686A8C6E-87F4-7C3C-C7A1-8ADBAFA4C7FC}"/>
-              </a:ext>
-            </a:extLst>
-          </p:cNvPr>
-          <p:cNvSpPr/>
-          <p:nvPr/>
-        </p:nvSpPr>
-        <p:spPr>
-          <a:xfrm>
-            <a:off x="9976419" y="1375923"/>
-            <a:ext cx="1292772" cy="384679"/>
-          </a:xfrm>
-          <a:prstGeom prst="rect">
-            <a:avLst/>
-          </a:prstGeom>
-          <a:noFill/>
-          <a:ln w="28575">
-            <a:solidFill>
-              <a:schemeClr val="accent1"/>
-            </a:solidFill>
-          </a:ln>
-        </p:spPr>
-        <p:style>
-          <a:lnRef idx="2">
-            <a:schemeClr val="accent1">
-              <a:shade val="15000"/>
-            </a:schemeClr>
-          </a:lnRef>
-          <a:fillRef idx="1">
-            <a:schemeClr val="accent1"/>
-          </a:fillRef>
-          <a:effectRef idx="0">
-            <a:schemeClr val="accent1"/>
-          </a:effectRef>
-          <a:fontRef idx="minor">
-            <a:schemeClr val="lt1"/>
-          </a:fontRef>
-        </p:style>
-        <p:txBody>
-          <a:bodyPr rtlCol="0" anchor="ctr"/>
-          <a:lstStyle/>
-          <a:p>
-            <a:pPr algn="ctr"/>
-            <a:endParaRPr lang="es-ES"/>
-          </a:p>
-        </p:txBody>
-      </p:sp>
-      <p:sp>
-        <p:nvSpPr>
-          <p:cNvPr id="14" name="Rectángulo 13">
-            <a:extLst>
-              <a:ext uri="{FF2B5EF4-FFF2-40B4-BE49-F238E27FC236}">
-                <a16:creationId xmlns:a16="http://schemas.microsoft.com/office/drawing/2014/main" id="{CB95AB96-EFE7-4939-B367-2CEBC10556D9}"/>
-              </a:ext>
-            </a:extLst>
-          </p:cNvPr>
-          <p:cNvSpPr/>
-          <p:nvPr/>
-        </p:nvSpPr>
-        <p:spPr>
-          <a:xfrm>
-            <a:off x="9976419" y="1760602"/>
-            <a:ext cx="1292772" cy="384679"/>
-          </a:xfrm>
-          <a:prstGeom prst="rect">
-            <a:avLst/>
-          </a:prstGeom>
-          <a:noFill/>
-          <a:ln w="28575">
-            <a:solidFill>
-              <a:srgbClr val="00B0F0"/>
-            </a:solidFill>
-          </a:ln>
-        </p:spPr>
-        <p:style>
-          <a:lnRef idx="2">
-            <a:schemeClr val="accent1">
-              <a:shade val="15000"/>
-            </a:schemeClr>
-          </a:lnRef>
-          <a:fillRef idx="1">
-            <a:schemeClr val="accent1"/>
-          </a:fillRef>
-          <a:effectRef idx="0">
-            <a:schemeClr val="accent1"/>
-          </a:effectRef>
-          <a:fontRef idx="minor">
-            <a:schemeClr val="lt1"/>
-          </a:fontRef>
-        </p:style>
-        <p:txBody>
-          <a:bodyPr rtlCol="0" anchor="ctr"/>
-          <a:lstStyle/>
-          <a:p>
-            <a:pPr algn="ctr"/>
-            <a:endParaRPr lang="es-ES"/>
-          </a:p>
-        </p:txBody>
-      </p:sp>
-      <p:sp>
-        <p:nvSpPr>
-          <p:cNvPr id="15" name="Rectángulo 14">
-            <a:extLst>
-              <a:ext uri="{FF2B5EF4-FFF2-40B4-BE49-F238E27FC236}">
-                <a16:creationId xmlns:a16="http://schemas.microsoft.com/office/drawing/2014/main" id="{CC710657-50FE-70B2-7A4C-3C1136E04508}"/>
-              </a:ext>
-            </a:extLst>
-          </p:cNvPr>
-          <p:cNvSpPr/>
-          <p:nvPr/>
-        </p:nvSpPr>
-        <p:spPr>
-          <a:xfrm>
-            <a:off x="7088177" y="2226691"/>
-            <a:ext cx="4307139" cy="1670545"/>
-          </a:xfrm>
-          <a:prstGeom prst="rect">
-            <a:avLst/>
-          </a:prstGeom>
-          <a:noFill/>
-          <a:ln w="28575" cap="flat" cmpd="sng" algn="ctr">
-            <a:solidFill>
-              <a:schemeClr val="accent5"/>
-            </a:solidFill>
-            <a:prstDash val="solid"/>
-            <a:round/>
-            <a:headEnd type="none" w="med" len="med"/>
-            <a:tailEnd type="none" w="med" len="med"/>
-          </a:ln>
-        </p:spPr>
-        <p:style>
-          <a:lnRef idx="0">
-            <a:scrgbClr r="0" g="0" b="0"/>
-          </a:lnRef>
-          <a:fillRef idx="0">
-            <a:scrgbClr r="0" g="0" b="0"/>
-          </a:fillRef>
-          <a:effectRef idx="0">
-            <a:scrgbClr r="0" g="0" b="0"/>
-          </a:effectRef>
-          <a:fontRef idx="minor">
-            <a:schemeClr val="accent5"/>
-          </a:fontRef>
-        </p:style>
-        <p:txBody>
-          <a:bodyPr rtlCol="0" anchor="ctr"/>
-          <a:lstStyle/>
-          <a:p>
-            <a:pPr algn="ctr"/>
-            <a:endParaRPr lang="es-ES"/>
-          </a:p>
-        </p:txBody>
-      </p:sp>
     </p:spTree>
     <p:extLst>
       <p:ext uri="{BB962C8B-B14F-4D97-AF65-F5344CB8AC3E}">
-        <p14:creationId xmlns:p14="http://schemas.microsoft.com/office/powerpoint/2010/main" val="823993469"/>
+        <p14:creationId xmlns:p14="http://schemas.microsoft.com/office/powerpoint/2010/main" val="2243974425"/>
       </p:ext>
     </p:extLst>
   </p:cSld>
@@ -11031,346 +10738,62 @@
           <a:p>
             <a:r>
               <a:rPr lang="es-ES" dirty="0"/>
-              <a:t>SPM (¿LO SABÍAS?)</a:t>
-            </a:r>
-          </a:p>
-        </p:txBody>
-      </p:sp>
-      <p:sp>
-        <p:nvSpPr>
-          <p:cNvPr id="4" name="CuadroTexto 3">
-            <a:extLst>
-              <a:ext uri="{FF2B5EF4-FFF2-40B4-BE49-F238E27FC236}">
-                <a16:creationId xmlns:a16="http://schemas.microsoft.com/office/drawing/2014/main" id="{F09FAD2E-7DFD-F4D1-D2B4-2F967D6DC49A}"/>
-              </a:ext>
-            </a:extLst>
-          </p:cNvPr>
-          <p:cNvSpPr txBox="1"/>
-          <p:nvPr/>
-        </p:nvSpPr>
-        <p:spPr>
-          <a:xfrm>
-            <a:off x="609372" y="1349528"/>
-            <a:ext cx="9985056" cy="2031325"/>
-          </a:xfrm>
-          <a:prstGeom prst="rect">
-            <a:avLst/>
-          </a:prstGeom>
-          <a:noFill/>
-        </p:spPr>
-        <p:txBody>
-          <a:bodyPr wrap="square" rtlCol="0">
-            <a:spAutoFit/>
-          </a:bodyPr>
-          <a:lstStyle/>
-          <a:p>
-            <a:pPr marL="285750" indent="-285750">
-              <a:buFont typeface="Arial" panose="020B0604020202020204" pitchFamily="34" charset="0"/>
-              <a:buChar char="•"/>
-            </a:pPr>
-            <a:r>
-              <a:rPr lang="es-ES" dirty="0"/>
-              <a:t>Permite </a:t>
-            </a:r>
-            <a:r>
-              <a:rPr lang="es-ES" dirty="0" err="1"/>
-              <a:t>scriptar</a:t>
-            </a:r>
-            <a:r>
-              <a:rPr lang="es-ES" dirty="0"/>
-              <a:t> a través de Matlab</a:t>
-            </a:r>
-          </a:p>
-          <a:p>
-            <a:pPr marL="285750" indent="-285750">
-              <a:buFont typeface="Arial" panose="020B0604020202020204" pitchFamily="34" charset="0"/>
-              <a:buChar char="•"/>
-            </a:pPr>
-            <a:r>
-              <a:rPr lang="es-ES" dirty="0"/>
-              <a:t>Si no tienes Matlab, existe una versión </a:t>
-            </a:r>
-            <a:r>
-              <a:rPr lang="es-ES" u="sng" dirty="0" err="1"/>
-              <a:t>standalone</a:t>
-            </a:r>
-            <a:r>
-              <a:rPr lang="es-ES" dirty="0"/>
-              <a:t>: </a:t>
-            </a:r>
-            <a:r>
-              <a:rPr lang="es-ES" dirty="0">
-                <a:hlinkClick r:id="rId2"/>
-              </a:rPr>
-              <a:t>https://en.wikibooks.org/wiki/SPM/Standalone</a:t>
-            </a:r>
-            <a:r>
-              <a:rPr lang="es-ES" dirty="0"/>
-              <a:t> </a:t>
-            </a:r>
-          </a:p>
-          <a:p>
-            <a:pPr marL="285750" indent="-285750">
-              <a:buFont typeface="Arial" panose="020B0604020202020204" pitchFamily="34" charset="0"/>
-              <a:buChar char="•"/>
-            </a:pPr>
-            <a:r>
-              <a:rPr lang="es-ES" dirty="0"/>
-              <a:t>Esta versión </a:t>
-            </a:r>
-            <a:r>
-              <a:rPr lang="es-ES" b="1" u="sng" dirty="0"/>
-              <a:t>tiene solo el SPM básico</a:t>
-            </a:r>
-            <a:r>
-              <a:rPr lang="es-ES" dirty="0"/>
-              <a:t>, sin embargo, si quieres crear tu propio </a:t>
-            </a:r>
-            <a:r>
-              <a:rPr lang="es-ES" dirty="0" err="1"/>
-              <a:t>standalone</a:t>
-            </a:r>
-            <a:r>
-              <a:rPr lang="es-ES" dirty="0"/>
-              <a:t> con los </a:t>
-            </a:r>
-            <a:r>
-              <a:rPr lang="es-ES" dirty="0" err="1"/>
-              <a:t>toolbox</a:t>
-            </a:r>
-            <a:r>
-              <a:rPr lang="es-ES" dirty="0"/>
-              <a:t> que necesites, </a:t>
-            </a:r>
-            <a:r>
-              <a:rPr lang="es-ES" b="1" u="sng" dirty="0"/>
-              <a:t>puedes crearte tu propia versión </a:t>
-            </a:r>
-            <a:r>
-              <a:rPr lang="es-ES" b="1" u="sng" dirty="0" err="1"/>
-              <a:t>standalone</a:t>
-            </a:r>
-            <a:r>
-              <a:rPr lang="es-ES" b="1" u="sng" dirty="0"/>
-              <a:t> </a:t>
-            </a:r>
-            <a:r>
-              <a:rPr lang="es-ES" dirty="0"/>
-              <a:t>utilizando la siguiente función dentro de SPM:</a:t>
-            </a:r>
-          </a:p>
-          <a:p>
-            <a:pPr marL="285750" indent="-285750">
-              <a:buFont typeface="Arial" panose="020B0604020202020204" pitchFamily="34" charset="0"/>
-              <a:buChar char="•"/>
-            </a:pPr>
-            <a:endParaRPr lang="es-ES" dirty="0"/>
-          </a:p>
-          <a:p>
-            <a:endParaRPr lang="es-ES" dirty="0"/>
+              <a:t>Normalización espacial PET</a:t>
+            </a:r>
           </a:p>
         </p:txBody>
       </p:sp>
       <p:pic>
         <p:nvPicPr>
-          <p:cNvPr id="6" name="Imagen 5">
-            <a:extLst>
-              <a:ext uri="{FF2B5EF4-FFF2-40B4-BE49-F238E27FC236}">
-                <a16:creationId xmlns:a16="http://schemas.microsoft.com/office/drawing/2014/main" id="{B5A2D75A-9F34-861C-5751-F50BDD79594F}"/>
+          <p:cNvPr id="1026" name="Picture 2" descr="Schematic illustrating that registering images to a common space to facilitate group statistics.">
+            <a:extLst>
+              <a:ext uri="{FF2B5EF4-FFF2-40B4-BE49-F238E27FC236}">
+                <a16:creationId xmlns:a16="http://schemas.microsoft.com/office/drawing/2014/main" id="{7A060896-9E94-F800-640F-9AFBC26380C1}"/>
               </a:ext>
             </a:extLst>
           </p:cNvPr>
           <p:cNvPicPr>
-            <a:picLocks noChangeAspect="1"/>
+            <a:picLocks noChangeAspect="1" noChangeArrowheads="1"/>
           </p:cNvPicPr>
           <p:nvPr/>
         </p:nvPicPr>
         <p:blipFill>
-          <a:blip r:embed="rId3"/>
+          <a:blip r:embed="rId2">
+            <a:extLst>
+              <a:ext uri="{28A0092B-C50C-407E-A947-70E740481C1C}">
+                <a14:useLocalDpi xmlns:a14="http://schemas.microsoft.com/office/drawing/2010/main" val="0"/>
+              </a:ext>
+            </a:extLst>
+          </a:blip>
+          <a:srcRect/>
           <a:stretch>
             <a:fillRect/>
           </a:stretch>
         </p:blipFill>
-        <p:spPr>
+        <p:spPr bwMode="auto">
           <a:xfrm>
-            <a:off x="821718" y="3525896"/>
-            <a:ext cx="5343650" cy="2362337"/>
+            <a:off x="1868681" y="1618826"/>
+            <a:ext cx="8454638" cy="4141047"/>
           </a:xfrm>
           <a:prstGeom prst="rect">
             <a:avLst/>
           </a:prstGeom>
+          <a:noFill/>
+          <a:extLst>
+            <a:ext uri="{909E8E84-426E-40DD-AFC4-6F175D3DCCD1}">
+              <a14:hiddenFill xmlns:a14="http://schemas.microsoft.com/office/drawing/2010/main">
+                <a:solidFill>
+                  <a:srgbClr val="FFFFFF"/>
+                </a:solidFill>
+              </a14:hiddenFill>
+            </a:ext>
+          </a:extLst>
         </p:spPr>
       </p:pic>
-      <p:sp>
-        <p:nvSpPr>
-          <p:cNvPr id="16" name="CuadroTexto 15">
-            <a:extLst>
-              <a:ext uri="{FF2B5EF4-FFF2-40B4-BE49-F238E27FC236}">
-                <a16:creationId xmlns:a16="http://schemas.microsoft.com/office/drawing/2014/main" id="{1C5F3CDA-C698-6FD9-61E6-FEAF33F26DF7}"/>
-              </a:ext>
-            </a:extLst>
-          </p:cNvPr>
-          <p:cNvSpPr txBox="1"/>
-          <p:nvPr/>
-        </p:nvSpPr>
-        <p:spPr>
-          <a:xfrm>
-            <a:off x="7291551" y="2855630"/>
-            <a:ext cx="3542511" cy="369332"/>
-          </a:xfrm>
-          <a:prstGeom prst="rect">
-            <a:avLst/>
-          </a:prstGeom>
-          <a:noFill/>
-        </p:spPr>
-        <p:txBody>
-          <a:bodyPr wrap="square">
-            <a:spAutoFit/>
-          </a:bodyPr>
-          <a:lstStyle/>
-          <a:p>
-            <a:r>
-              <a:rPr lang="es-ES" dirty="0">
-                <a:hlinkClick r:id="rId4"/>
-              </a:rPr>
-              <a:t>https://github.com/txusser/Anapyce</a:t>
-            </a:r>
-            <a:r>
-              <a:rPr lang="es-ES" dirty="0"/>
-              <a:t> </a:t>
-            </a:r>
-          </a:p>
-        </p:txBody>
-      </p:sp>
-      <p:pic>
-        <p:nvPicPr>
-          <p:cNvPr id="22" name="Imagen 21">
-            <a:extLst>
-              <a:ext uri="{FF2B5EF4-FFF2-40B4-BE49-F238E27FC236}">
-                <a16:creationId xmlns:a16="http://schemas.microsoft.com/office/drawing/2014/main" id="{A0A08FC6-AAD4-C651-3A28-B8B4A1D47274}"/>
-              </a:ext>
-            </a:extLst>
-          </p:cNvPr>
-          <p:cNvPicPr>
-            <a:picLocks noChangeAspect="1"/>
-          </p:cNvPicPr>
-          <p:nvPr/>
-        </p:nvPicPr>
-        <p:blipFill>
-          <a:blip r:embed="rId5"/>
-          <a:stretch>
-            <a:fillRect/>
-          </a:stretch>
-        </p:blipFill>
-        <p:spPr>
-          <a:xfrm>
-            <a:off x="7137754" y="3421117"/>
-            <a:ext cx="3850104" cy="2689799"/>
-          </a:xfrm>
-          <a:prstGeom prst="rect">
-            <a:avLst/>
-          </a:prstGeom>
-        </p:spPr>
-      </p:pic>
-      <p:sp>
-        <p:nvSpPr>
-          <p:cNvPr id="23" name="Rectángulo 22">
-            <a:extLst>
-              <a:ext uri="{FF2B5EF4-FFF2-40B4-BE49-F238E27FC236}">
-                <a16:creationId xmlns:a16="http://schemas.microsoft.com/office/drawing/2014/main" id="{4B532AB5-C1F9-D418-258C-D92FB0CC9DD1}"/>
-              </a:ext>
-            </a:extLst>
-          </p:cNvPr>
-          <p:cNvSpPr/>
-          <p:nvPr/>
-        </p:nvSpPr>
-        <p:spPr>
-          <a:xfrm>
-            <a:off x="7342001" y="5801710"/>
-            <a:ext cx="635351" cy="239636"/>
-          </a:xfrm>
-          <a:prstGeom prst="rect">
-            <a:avLst/>
-          </a:prstGeom>
-          <a:noFill/>
-          <a:ln w="28575" cap="flat" cmpd="sng" algn="ctr">
-            <a:solidFill>
-              <a:schemeClr val="accent2"/>
-            </a:solidFill>
-            <a:prstDash val="solid"/>
-            <a:round/>
-            <a:headEnd type="none" w="med" len="med"/>
-            <a:tailEnd type="none" w="med" len="med"/>
-          </a:ln>
-        </p:spPr>
-        <p:style>
-          <a:lnRef idx="0">
-            <a:scrgbClr r="0" g="0" b="0"/>
-          </a:lnRef>
-          <a:fillRef idx="0">
-            <a:scrgbClr r="0" g="0" b="0"/>
-          </a:fillRef>
-          <a:effectRef idx="0">
-            <a:scrgbClr r="0" g="0" b="0"/>
-          </a:effectRef>
-          <a:fontRef idx="minor">
-            <a:schemeClr val="accent2"/>
-          </a:fontRef>
-        </p:style>
-        <p:txBody>
-          <a:bodyPr rtlCol="0" anchor="ctr"/>
-          <a:lstStyle/>
-          <a:p>
-            <a:pPr algn="ctr"/>
-            <a:endParaRPr lang="es-ES"/>
-          </a:p>
-        </p:txBody>
-      </p:sp>
-      <p:sp>
-        <p:nvSpPr>
-          <p:cNvPr id="25" name="CuadroTexto 24">
-            <a:extLst>
-              <a:ext uri="{FF2B5EF4-FFF2-40B4-BE49-F238E27FC236}">
-                <a16:creationId xmlns:a16="http://schemas.microsoft.com/office/drawing/2014/main" id="{AD33ED7E-8767-5A04-D762-F50A30C423AE}"/>
-              </a:ext>
-            </a:extLst>
-          </p:cNvPr>
-          <p:cNvSpPr txBox="1"/>
-          <p:nvPr/>
-        </p:nvSpPr>
-        <p:spPr>
-          <a:xfrm>
-            <a:off x="2122543" y="2864426"/>
-            <a:ext cx="2603263" cy="369332"/>
-          </a:xfrm>
-          <a:prstGeom prst="rect">
-            <a:avLst/>
-          </a:prstGeom>
-          <a:noFill/>
-        </p:spPr>
-        <p:txBody>
-          <a:bodyPr wrap="square">
-            <a:spAutoFit/>
-          </a:bodyPr>
-          <a:lstStyle/>
-          <a:p>
-            <a:r>
-              <a:rPr lang="es-ES" dirty="0">
-                <a:hlinkClick r:id="rId6"/>
-              </a:rPr>
-              <a:t>https://github.com/spm</a:t>
-            </a:r>
-            <a:r>
-              <a:rPr lang="es-ES" dirty="0"/>
-              <a:t> </a:t>
-            </a:r>
-          </a:p>
-        </p:txBody>
-      </p:sp>
     </p:spTree>
     <p:extLst>
       <p:ext uri="{BB962C8B-B14F-4D97-AF65-F5344CB8AC3E}">
-        <p14:creationId xmlns:p14="http://schemas.microsoft.com/office/powerpoint/2010/main" val="2269543595"/>
+        <p14:creationId xmlns:p14="http://schemas.microsoft.com/office/powerpoint/2010/main" val="3568077784"/>
       </p:ext>
     </p:extLst>
   </p:cSld>
@@ -11416,26 +10839,276 @@
         <p:spPr>
           <a:xfrm>
             <a:off x="975360" y="795528"/>
-            <a:ext cx="10241280" cy="667512"/>
-          </a:xfrm>
-        </p:spPr>
-        <p:txBody>
-          <a:bodyPr/>
+            <a:ext cx="10241280" cy="528775"/>
+          </a:xfrm>
+        </p:spPr>
+        <p:txBody>
+          <a:bodyPr>
+            <a:normAutofit fontScale="90000"/>
+          </a:bodyPr>
           <a:lstStyle/>
           <a:p>
             <a:r>
               <a:rPr lang="es-ES" dirty="0"/>
-              <a:t>IMAGEN PET</a:t>
-            </a:r>
+              <a:t>NORMALIZACIÓN EN INTENSIDAD</a:t>
+            </a:r>
+          </a:p>
+        </p:txBody>
+      </p:sp>
+      <p:sp>
+        <p:nvSpPr>
+          <p:cNvPr id="3" name="CuadroTexto 2">
+            <a:extLst>
+              <a:ext uri="{FF2B5EF4-FFF2-40B4-BE49-F238E27FC236}">
+                <a16:creationId xmlns:a16="http://schemas.microsoft.com/office/drawing/2014/main" id="{B9B0CAFE-B569-2B02-6F49-2FD4C6AA09F1}"/>
+              </a:ext>
+            </a:extLst>
+          </p:cNvPr>
+          <p:cNvSpPr txBox="1"/>
+          <p:nvPr/>
+        </p:nvSpPr>
+        <p:spPr>
+          <a:xfrm>
+            <a:off x="5797189" y="1508409"/>
+            <a:ext cx="2325861" cy="307777"/>
+          </a:xfrm>
+          <a:prstGeom prst="rect">
+            <a:avLst/>
+          </a:prstGeom>
+          <a:noFill/>
+        </p:spPr>
+        <p:txBody>
+          <a:bodyPr wrap="square">
+            <a:spAutoFit/>
+          </a:bodyPr>
+          <a:lstStyle/>
+          <a:p>
+            <a:r>
+              <a:rPr lang="es-ES" altLang="es-ES" sz="1400" b="1" dirty="0">
+                <a:solidFill>
+                  <a:srgbClr val="FF0000"/>
+                </a:solidFill>
+              </a:rPr>
+              <a:t>Muy importante en PET!</a:t>
+            </a:r>
+            <a:endParaRPr lang="es-ES" sz="1400" b="1" dirty="0">
+              <a:solidFill>
+                <a:srgbClr val="FF0000"/>
+              </a:solidFill>
+            </a:endParaRPr>
           </a:p>
         </p:txBody>
       </p:sp>
       <p:pic>
         <p:nvPicPr>
-          <p:cNvPr id="17" name="Imagen 16" descr="Escala de tiempo&#10;&#10;Descripción generada automáticamente">
-            <a:extLst>
-              <a:ext uri="{FF2B5EF4-FFF2-40B4-BE49-F238E27FC236}">
-                <a16:creationId xmlns:a16="http://schemas.microsoft.com/office/drawing/2014/main" id="{B81CF3CA-92C2-B5ED-EB38-3FAED9A61D96}"/>
+          <p:cNvPr id="4" name="Picture 2" descr="Fig 1">
+            <a:extLst>
+              <a:ext uri="{FF2B5EF4-FFF2-40B4-BE49-F238E27FC236}">
+                <a16:creationId xmlns:a16="http://schemas.microsoft.com/office/drawing/2014/main" id="{24EC08FA-DC90-BB61-4121-DD1E36BEED70}"/>
+              </a:ext>
+            </a:extLst>
+          </p:cNvPr>
+          <p:cNvPicPr>
+            <a:picLocks noChangeAspect="1" noChangeArrowheads="1"/>
+          </p:cNvPicPr>
+          <p:nvPr/>
+        </p:nvPicPr>
+        <p:blipFill>
+          <a:blip r:embed="rId2">
+            <a:extLst>
+              <a:ext uri="{28A0092B-C50C-407E-A947-70E740481C1C}">
+                <a14:useLocalDpi xmlns:a14="http://schemas.microsoft.com/office/drawing/2010/main" val="0"/>
+              </a:ext>
+            </a:extLst>
+          </a:blip>
+          <a:srcRect/>
+          <a:stretch>
+            <a:fillRect/>
+          </a:stretch>
+        </p:blipFill>
+        <p:spPr bwMode="auto">
+          <a:xfrm>
+            <a:off x="1498823" y="1582858"/>
+            <a:ext cx="2924008" cy="3338191"/>
+          </a:xfrm>
+          <a:prstGeom prst="rect">
+            <a:avLst/>
+          </a:prstGeom>
+          <a:noFill/>
+          <a:extLst>
+            <a:ext uri="{909E8E84-426E-40DD-AFC4-6F175D3DCCD1}">
+              <a14:hiddenFill xmlns:a14="http://schemas.microsoft.com/office/drawing/2010/main">
+                <a:solidFill>
+                  <a:srgbClr val="FFFFFF"/>
+                </a:solidFill>
+              </a14:hiddenFill>
+            </a:ext>
+          </a:extLst>
+        </p:spPr>
+      </p:pic>
+      <p:sp>
+        <p:nvSpPr>
+          <p:cNvPr id="5" name="30 Rectángulo">
+            <a:extLst>
+              <a:ext uri="{FF2B5EF4-FFF2-40B4-BE49-F238E27FC236}">
+                <a16:creationId xmlns:a16="http://schemas.microsoft.com/office/drawing/2014/main" id="{157C497C-D90B-1C09-A882-E79631D5F852}"/>
+              </a:ext>
+            </a:extLst>
+          </p:cNvPr>
+          <p:cNvSpPr/>
+          <p:nvPr/>
+        </p:nvSpPr>
+        <p:spPr>
+          <a:xfrm>
+            <a:off x="5797189" y="1878481"/>
+            <a:ext cx="5843475" cy="815608"/>
+          </a:xfrm>
+          <a:prstGeom prst="rect">
+            <a:avLst/>
+          </a:prstGeom>
+        </p:spPr>
+        <p:txBody>
+          <a:bodyPr wrap="square">
+            <a:spAutoFit/>
+          </a:bodyPr>
+          <a:lstStyle/>
+          <a:p>
+            <a:pPr>
+              <a:spcAft>
+                <a:spcPts val="600"/>
+              </a:spcAft>
+            </a:pPr>
+            <a:r>
+              <a:rPr lang="es-ES" altLang="es-ES" sz="1400" b="1" dirty="0">
+                <a:solidFill>
+                  <a:srgbClr val="002060"/>
+                </a:solidFill>
+              </a:rPr>
+              <a:t>Selección de una región de referencia</a:t>
+            </a:r>
+            <a:endParaRPr lang="es-ES_tradnl" altLang="es-ES" sz="1400" dirty="0">
+              <a:solidFill>
+                <a:srgbClr val="002060"/>
+              </a:solidFill>
+            </a:endParaRPr>
+          </a:p>
+          <a:p>
+            <a:pPr marL="742932" lvl="1" indent="-285744">
+              <a:buFont typeface="Wingdings" panose="05000000000000000000" pitchFamily="2" charset="2"/>
+              <a:buChar char="ü"/>
+            </a:pPr>
+            <a:r>
+              <a:rPr lang="es-ES_tradnl" altLang="es-ES" sz="1400" dirty="0">
+                <a:solidFill>
+                  <a:srgbClr val="002060"/>
+                </a:solidFill>
+              </a:rPr>
+              <a:t>Se generan biomarcadores relativos a una región sin cambios</a:t>
+            </a:r>
+          </a:p>
+          <a:p>
+            <a:pPr marL="742932" lvl="1" indent="-285744">
+              <a:buFont typeface="Wingdings" panose="05000000000000000000" pitchFamily="2" charset="2"/>
+              <a:buChar char="ü"/>
+            </a:pPr>
+            <a:r>
+              <a:rPr lang="es-ES_tradnl" altLang="es-ES" sz="1400" dirty="0">
+                <a:solidFill>
+                  <a:srgbClr val="FF0000"/>
+                </a:solidFill>
+              </a:rPr>
+              <a:t>Seleccionar la región adecuada es complicado</a:t>
+            </a:r>
+          </a:p>
+        </p:txBody>
+      </p:sp>
+      <p:sp>
+        <p:nvSpPr>
+          <p:cNvPr id="6" name="30 Rectángulo">
+            <a:extLst>
+              <a:ext uri="{FF2B5EF4-FFF2-40B4-BE49-F238E27FC236}">
+                <a16:creationId xmlns:a16="http://schemas.microsoft.com/office/drawing/2014/main" id="{CF94C1FB-B08E-9096-0CC3-2941B61F82BB}"/>
+              </a:ext>
+            </a:extLst>
+          </p:cNvPr>
+          <p:cNvSpPr/>
+          <p:nvPr/>
+        </p:nvSpPr>
+        <p:spPr>
+          <a:xfrm>
+            <a:off x="5797189" y="2817976"/>
+            <a:ext cx="5457257" cy="1031051"/>
+          </a:xfrm>
+          <a:prstGeom prst="rect">
+            <a:avLst/>
+          </a:prstGeom>
+        </p:spPr>
+        <p:txBody>
+          <a:bodyPr wrap="square">
+            <a:spAutoFit/>
+          </a:bodyPr>
+          <a:lstStyle/>
+          <a:p>
+            <a:pPr>
+              <a:spcAft>
+                <a:spcPts val="600"/>
+              </a:spcAft>
+            </a:pPr>
+            <a:r>
+              <a:rPr lang="es-ES" altLang="es-ES" sz="1400" b="1" dirty="0">
+                <a:solidFill>
+                  <a:srgbClr val="002060"/>
+                </a:solidFill>
+              </a:rPr>
+              <a:t>Normalización mediante un factor de escala global</a:t>
+            </a:r>
+            <a:endParaRPr lang="es-ES_tradnl" altLang="es-ES" sz="1400" dirty="0">
+              <a:solidFill>
+                <a:srgbClr val="002060"/>
+              </a:solidFill>
+            </a:endParaRPr>
+          </a:p>
+          <a:p>
+            <a:pPr marL="742932" lvl="1" indent="-285744">
+              <a:buFont typeface="Wingdings" panose="05000000000000000000" pitchFamily="2" charset="2"/>
+              <a:buChar char="ü"/>
+            </a:pPr>
+            <a:r>
+              <a:rPr lang="es-ES_tradnl" altLang="es-ES" sz="1400" dirty="0">
+                <a:solidFill>
+                  <a:srgbClr val="002060"/>
+                </a:solidFill>
+              </a:rPr>
+              <a:t>Se multiplica/divide toda la imagen por un mismo factor (máximo, media…)</a:t>
+            </a:r>
+          </a:p>
+          <a:p>
+            <a:pPr marL="742932" lvl="1" indent="-285744">
+              <a:buFont typeface="Wingdings" panose="05000000000000000000" pitchFamily="2" charset="2"/>
+              <a:buChar char="ü"/>
+            </a:pPr>
+            <a:r>
+              <a:rPr lang="es-ES_tradnl" altLang="es-ES" sz="1400" dirty="0">
+                <a:solidFill>
+                  <a:srgbClr val="FF0000"/>
+                </a:solidFill>
+              </a:rPr>
+              <a:t>No funciona cuando hay diferencias grandes en la distribución</a:t>
+            </a:r>
+            <a:endParaRPr lang="es-ES" altLang="es-ES" sz="1400" dirty="0">
+              <a:solidFill>
+                <a:srgbClr val="FF0000"/>
+              </a:solidFill>
+            </a:endParaRPr>
+          </a:p>
+        </p:txBody>
+      </p:sp>
+      <p:pic>
+        <p:nvPicPr>
+          <p:cNvPr id="8" name="Imagen 7">
+            <a:extLst>
+              <a:ext uri="{FF2B5EF4-FFF2-40B4-BE49-F238E27FC236}">
+                <a16:creationId xmlns:a16="http://schemas.microsoft.com/office/drawing/2014/main" id="{5CA97366-A6DC-8718-A2AC-10150F278C21}"/>
               </a:ext>
             </a:extLst>
           </p:cNvPr>
@@ -11444,182 +11117,99 @@
           </p:cNvPicPr>
           <p:nvPr/>
         </p:nvPicPr>
+        <p:blipFill rotWithShape="1">
+          <a:blip r:embed="rId3"/>
+          <a:srcRect t="42878" b="28523"/>
+          <a:stretch/>
+        </p:blipFill>
+        <p:spPr>
+          <a:xfrm>
+            <a:off x="6119345" y="4103363"/>
+            <a:ext cx="4812943" cy="1520106"/>
+          </a:xfrm>
+          <a:prstGeom prst="rect">
+            <a:avLst/>
+          </a:prstGeom>
+          <a:ln w="38100" cap="sq">
+            <a:solidFill>
+              <a:schemeClr val="accent1"/>
+            </a:solidFill>
+            <a:prstDash val="solid"/>
+            <a:miter lim="800000"/>
+          </a:ln>
+          <a:effectLst>
+            <a:outerShdw blurRad="50800" dist="38100" dir="2700000" algn="tl" rotWithShape="0">
+              <a:srgbClr val="000000">
+                <a:alpha val="43000"/>
+              </a:srgbClr>
+            </a:outerShdw>
+          </a:effectLst>
+        </p:spPr>
+      </p:pic>
+      <p:sp>
+        <p:nvSpPr>
+          <p:cNvPr id="9" name="CuadroTexto 8">
+            <a:extLst>
+              <a:ext uri="{FF2B5EF4-FFF2-40B4-BE49-F238E27FC236}">
+                <a16:creationId xmlns:a16="http://schemas.microsoft.com/office/drawing/2014/main" id="{C2F7C4F0-6F3D-00A3-C9FC-773727430A68}"/>
+              </a:ext>
+            </a:extLst>
+          </p:cNvPr>
+          <p:cNvSpPr txBox="1"/>
+          <p:nvPr/>
+        </p:nvSpPr>
+        <p:spPr>
+          <a:xfrm>
+            <a:off x="7004630" y="5859308"/>
+            <a:ext cx="3042371" cy="369332"/>
+          </a:xfrm>
+          <a:prstGeom prst="rect">
+            <a:avLst/>
+          </a:prstGeom>
+          <a:noFill/>
+          <a:ln>
+            <a:solidFill>
+              <a:schemeClr val="accent1"/>
+            </a:solidFill>
+          </a:ln>
+        </p:spPr>
+        <p:txBody>
+          <a:bodyPr wrap="none" rtlCol="0">
+            <a:spAutoFit/>
+          </a:bodyPr>
+          <a:lstStyle/>
+          <a:p>
+            <a:r>
+              <a:rPr lang="es-ES" dirty="0"/>
+              <a:t>❗Opciones por defecto SPM</a:t>
+            </a:r>
+          </a:p>
+        </p:txBody>
+      </p:sp>
+      <p:pic>
+        <p:nvPicPr>
+          <p:cNvPr id="10" name="Imagen 9">
+            <a:extLst>
+              <a:ext uri="{FF2B5EF4-FFF2-40B4-BE49-F238E27FC236}">
+                <a16:creationId xmlns:a16="http://schemas.microsoft.com/office/drawing/2014/main" id="{5EBA2AEE-6280-2293-AB3E-7244AD3D0035}"/>
+              </a:ext>
+            </a:extLst>
+          </p:cNvPr>
+          <p:cNvPicPr>
+            <a:picLocks noChangeAspect="1"/>
+          </p:cNvPicPr>
+          <p:nvPr/>
+        </p:nvPicPr>
         <p:blipFill>
-          <a:blip r:embed="rId2">
-            <a:extLst>
-              <a:ext uri="{28A0092B-C50C-407E-A947-70E740481C1C}">
-                <a14:useLocalDpi xmlns:a14="http://schemas.microsoft.com/office/drawing/2010/main" val="0"/>
-              </a:ext>
-            </a:extLst>
-          </a:blip>
+          <a:blip r:embed="rId4"/>
           <a:stretch>
             <a:fillRect/>
           </a:stretch>
         </p:blipFill>
         <p:spPr>
           <a:xfrm>
-            <a:off x="975360" y="1828131"/>
-            <a:ext cx="5467350" cy="3952875"/>
-          </a:xfrm>
-          <a:prstGeom prst="rect">
-            <a:avLst/>
-          </a:prstGeom>
-        </p:spPr>
-      </p:pic>
-      <p:pic>
-        <p:nvPicPr>
-          <p:cNvPr id="19" name="Imagen 18">
-            <a:extLst>
-              <a:ext uri="{FF2B5EF4-FFF2-40B4-BE49-F238E27FC236}">
-                <a16:creationId xmlns:a16="http://schemas.microsoft.com/office/drawing/2014/main" id="{4DC42CBE-10FB-4669-2F2E-DA1C9CA062A4}"/>
-              </a:ext>
-            </a:extLst>
-          </p:cNvPr>
-          <p:cNvPicPr>
-            <a:picLocks noChangeAspect="1"/>
-          </p:cNvPicPr>
-          <p:nvPr/>
-        </p:nvPicPr>
-        <p:blipFill>
-          <a:blip r:embed="rId3"/>
-          <a:stretch>
-            <a:fillRect/>
-          </a:stretch>
-        </p:blipFill>
-        <p:spPr>
-          <a:xfrm>
-            <a:off x="3363053" y="5327663"/>
-            <a:ext cx="3079657" cy="906685"/>
-          </a:xfrm>
-          <a:prstGeom prst="rect">
-            <a:avLst/>
-          </a:prstGeom>
-        </p:spPr>
-      </p:pic>
-      <p:sp>
-        <p:nvSpPr>
-          <p:cNvPr id="21" name="CuadroTexto 20">
-            <a:extLst>
-              <a:ext uri="{FF2B5EF4-FFF2-40B4-BE49-F238E27FC236}">
-                <a16:creationId xmlns:a16="http://schemas.microsoft.com/office/drawing/2014/main" id="{738325D2-2D19-198B-B5C2-4A3483E005C5}"/>
-              </a:ext>
-            </a:extLst>
-          </p:cNvPr>
-          <p:cNvSpPr txBox="1"/>
-          <p:nvPr/>
-        </p:nvSpPr>
-        <p:spPr>
-          <a:xfrm>
-            <a:off x="7092247" y="1928361"/>
-            <a:ext cx="4612071" cy="1754326"/>
-          </a:xfrm>
-          <a:prstGeom prst="rect">
-            <a:avLst/>
-          </a:prstGeom>
-          <a:noFill/>
-        </p:spPr>
-        <p:txBody>
-          <a:bodyPr wrap="square">
-            <a:spAutoFit/>
-          </a:bodyPr>
-          <a:lstStyle/>
-          <a:p>
-            <a:r>
-              <a:rPr lang="es-ES" b="0" i="0" dirty="0">
-                <a:solidFill>
-                  <a:srgbClr val="202122"/>
-                </a:solidFill>
-                <a:effectLst/>
-                <a:latin typeface="Arial" panose="020B0604020202020204" pitchFamily="34" charset="0"/>
-              </a:rPr>
-              <a:t>Utiliza sustancias radiactivas conocidas como </a:t>
-            </a:r>
-            <a:r>
-              <a:rPr lang="es-ES" b="0" i="0" u="none" strike="noStrike" dirty="0" err="1">
-                <a:solidFill>
-                  <a:srgbClr val="3366CC"/>
-                </a:solidFill>
-                <a:effectLst/>
-                <a:latin typeface="Arial" panose="020B0604020202020204" pitchFamily="34" charset="0"/>
-                <a:hlinkClick r:id="rId4" tooltip="Radiotracer"/>
-              </a:rPr>
-              <a:t>radiotrazadores</a:t>
-            </a:r>
-            <a:r>
-              <a:rPr lang="es-ES" b="0" i="0" dirty="0">
-                <a:solidFill>
-                  <a:srgbClr val="202122"/>
-                </a:solidFill>
-                <a:effectLst/>
-                <a:latin typeface="Arial" panose="020B0604020202020204" pitchFamily="34" charset="0"/>
-              </a:rPr>
-              <a:t> para visualizar y medir actividad y cambios en </a:t>
-            </a:r>
-            <a:r>
-              <a:rPr lang="es-ES" b="0" i="0" u="none" strike="noStrike" dirty="0">
-                <a:solidFill>
-                  <a:srgbClr val="3366CC"/>
-                </a:solidFill>
-                <a:effectLst/>
-                <a:latin typeface="Arial" panose="020B0604020202020204" pitchFamily="34" charset="0"/>
-                <a:hlinkClick r:id="rId5" tooltip="Metabolism"/>
-              </a:rPr>
-              <a:t>los procesos </a:t>
-            </a:r>
-            <a:r>
-              <a:rPr lang="es-ES" b="0" i="0" u="none" strike="noStrike" dirty="0">
-                <a:solidFill>
-                  <a:srgbClr val="3366CC"/>
-                </a:solidFill>
-                <a:effectLst/>
-                <a:latin typeface="Arial" panose="020B0604020202020204" pitchFamily="34" charset="0"/>
-              </a:rPr>
-              <a:t>moleculares.</a:t>
-            </a:r>
-          </a:p>
-          <a:p>
-            <a:endParaRPr lang="es-ES" dirty="0">
-              <a:solidFill>
-                <a:srgbClr val="3366CC"/>
-              </a:solidFill>
-              <a:latin typeface="Arial" panose="020B0604020202020204" pitchFamily="34" charset="0"/>
-            </a:endParaRPr>
-          </a:p>
-          <a:p>
-            <a:endParaRPr lang="es-ES" dirty="0"/>
-          </a:p>
-        </p:txBody>
-      </p:sp>
-      <p:pic>
-        <p:nvPicPr>
-          <p:cNvPr id="23" name="Imagen 22" descr="Imagen de la pantalla de un video juego&#10;&#10;Descripción generada automáticamente con confianza baja">
-            <a:extLst>
-              <a:ext uri="{FF2B5EF4-FFF2-40B4-BE49-F238E27FC236}">
-                <a16:creationId xmlns:a16="http://schemas.microsoft.com/office/drawing/2014/main" id="{1683DB95-29CF-0954-98FD-09546A93C875}"/>
-              </a:ext>
-            </a:extLst>
-          </p:cNvPr>
-          <p:cNvPicPr>
-            <a:picLocks noChangeAspect="1"/>
-          </p:cNvPicPr>
-          <p:nvPr/>
-        </p:nvPicPr>
-        <p:blipFill>
-          <a:blip r:embed="rId6">
-            <a:extLst>
-              <a:ext uri="{28A0092B-C50C-407E-A947-70E740481C1C}">
-                <a14:useLocalDpi xmlns:a14="http://schemas.microsoft.com/office/drawing/2010/main" val="0"/>
-              </a:ext>
-            </a:extLst>
-          </a:blip>
-          <a:stretch>
-            <a:fillRect/>
-          </a:stretch>
-        </p:blipFill>
-        <p:spPr>
-          <a:xfrm>
-            <a:off x="7625044" y="3431280"/>
-            <a:ext cx="3546479" cy="2349725"/>
+            <a:off x="1013245" y="4988107"/>
+            <a:ext cx="3895164" cy="1323301"/>
           </a:xfrm>
           <a:prstGeom prst="rect">
             <a:avLst/>
@@ -11629,7 +11219,7 @@
     </p:spTree>
     <p:extLst>
       <p:ext uri="{BB962C8B-B14F-4D97-AF65-F5344CB8AC3E}">
-        <p14:creationId xmlns:p14="http://schemas.microsoft.com/office/powerpoint/2010/main" val="2243974425"/>
+        <p14:creationId xmlns:p14="http://schemas.microsoft.com/office/powerpoint/2010/main" val="2730915760"/>
       </p:ext>
     </p:extLst>
   </p:cSld>
@@ -11686,17 +11276,123 @@
           <a:p>
             <a:r>
               <a:rPr lang="es-ES" dirty="0"/>
-              <a:t>Normalización espacial PET</a:t>
-            </a:r>
+              <a:t>SPM</a:t>
+            </a:r>
+          </a:p>
+        </p:txBody>
+      </p:sp>
+      <p:sp>
+        <p:nvSpPr>
+          <p:cNvPr id="3" name="CuadroTexto 2">
+            <a:extLst>
+              <a:ext uri="{FF2B5EF4-FFF2-40B4-BE49-F238E27FC236}">
+                <a16:creationId xmlns:a16="http://schemas.microsoft.com/office/drawing/2014/main" id="{38494EC1-9A0C-CF2C-036A-4491745AEEB1}"/>
+              </a:ext>
+            </a:extLst>
+          </p:cNvPr>
+          <p:cNvSpPr txBox="1"/>
+          <p:nvPr/>
+        </p:nvSpPr>
+        <p:spPr>
+          <a:xfrm>
+            <a:off x="627829" y="1456676"/>
+            <a:ext cx="6358525" cy="1477328"/>
+          </a:xfrm>
+          <a:prstGeom prst="rect">
+            <a:avLst/>
+          </a:prstGeom>
+          <a:noFill/>
+        </p:spPr>
+        <p:txBody>
+          <a:bodyPr wrap="square" rtlCol="0">
+            <a:spAutoFit/>
+          </a:bodyPr>
+          <a:lstStyle/>
+          <a:p>
+            <a:pPr marL="285750" indent="-285750">
+              <a:buFont typeface="Arial" panose="020B0604020202020204" pitchFamily="34" charset="0"/>
+              <a:buChar char="•"/>
+            </a:pPr>
+            <a:r>
+              <a:rPr lang="es-ES" dirty="0"/>
+              <a:t>Software fundamental para cuantificación en neuroimagen</a:t>
+            </a:r>
+          </a:p>
+          <a:p>
+            <a:pPr marL="285750" indent="-285750">
+              <a:buFont typeface="Arial" panose="020B0604020202020204" pitchFamily="34" charset="0"/>
+              <a:buChar char="•"/>
+            </a:pPr>
+            <a:r>
+              <a:rPr lang="es-ES" dirty="0" err="1"/>
+              <a:t>Toolbox</a:t>
+            </a:r>
+            <a:r>
+              <a:rPr lang="es-ES" dirty="0"/>
+              <a:t> de Matlab (versión </a:t>
+            </a:r>
+            <a:r>
+              <a:rPr lang="es-ES" dirty="0" err="1"/>
+              <a:t>standalone</a:t>
+            </a:r>
+            <a:r>
+              <a:rPr lang="es-ES" dirty="0"/>
+              <a:t>)</a:t>
+            </a:r>
+          </a:p>
+          <a:p>
+            <a:pPr marL="285750" indent="-285750">
+              <a:buFont typeface="Arial" panose="020B0604020202020204" pitchFamily="34" charset="0"/>
+              <a:buChar char="•"/>
+            </a:pPr>
+            <a:r>
+              <a:rPr lang="es-ES" dirty="0"/>
+              <a:t>Se puede ampliar con </a:t>
+            </a:r>
+            <a:r>
+              <a:rPr lang="es-ES" dirty="0" err="1"/>
+              <a:t>toolbox</a:t>
+            </a:r>
+            <a:r>
+              <a:rPr lang="es-ES" dirty="0"/>
+              <a:t> adicionales</a:t>
+            </a:r>
+          </a:p>
+          <a:p>
+            <a:pPr marL="285750" indent="-285750">
+              <a:buFont typeface="Arial" panose="020B0604020202020204" pitchFamily="34" charset="0"/>
+              <a:buChar char="•"/>
+            </a:pPr>
+            <a:r>
+              <a:rPr lang="es-ES" dirty="0"/>
+              <a:t>Página web: </a:t>
+            </a:r>
+            <a:r>
+              <a:rPr lang="es-ES" dirty="0">
+                <a:hlinkClick r:id="rId2"/>
+              </a:rPr>
+              <a:t>https://www.fil.ion.ucl.ac.uk/spm/</a:t>
+            </a:r>
+            <a:r>
+              <a:rPr lang="es-ES" dirty="0"/>
+              <a:t> </a:t>
+            </a:r>
+          </a:p>
+          <a:p>
+            <a:pPr marL="285750" indent="-285750">
+              <a:buFont typeface="Arial" panose="020B0604020202020204" pitchFamily="34" charset="0"/>
+              <a:buChar char="•"/>
+            </a:pPr>
+            <a:endParaRPr lang="es-ES" dirty="0"/>
           </a:p>
         </p:txBody>
       </p:sp>
       <p:pic>
         <p:nvPicPr>
-          <p:cNvPr id="4" name="Imagen 3">
-            <a:extLst>
-              <a:ext uri="{FF2B5EF4-FFF2-40B4-BE49-F238E27FC236}">
-                <a16:creationId xmlns:a16="http://schemas.microsoft.com/office/drawing/2014/main" id="{69A13038-54C6-E0BD-B4CC-AED9096994AC}"/>
+          <p:cNvPr id="7" name="Imagen 6">
+            <a:extLst>
+              <a:ext uri="{FF2B5EF4-FFF2-40B4-BE49-F238E27FC236}">
+                <a16:creationId xmlns:a16="http://schemas.microsoft.com/office/drawing/2014/main" id="{4CF457C8-5F51-3CFB-1399-09E9D18BF30E}"/>
               </a:ext>
             </a:extLst>
           </p:cNvPr>
@@ -11706,45 +11402,75 @@
           <p:nvPr/>
         </p:nvPicPr>
         <p:blipFill>
-          <a:blip r:embed="rId2"/>
+          <a:blip r:embed="rId3"/>
           <a:stretch>
             <a:fillRect/>
           </a:stretch>
         </p:blipFill>
         <p:spPr>
           <a:xfrm>
-            <a:off x="454045" y="1627001"/>
-            <a:ext cx="3718707" cy="4107874"/>
+            <a:off x="1096847" y="2963726"/>
+            <a:ext cx="4999153" cy="3139712"/>
           </a:xfrm>
           <a:prstGeom prst="rect">
             <a:avLst/>
           </a:prstGeom>
         </p:spPr>
       </p:pic>
-      <p:sp>
-        <p:nvSpPr>
-          <p:cNvPr id="8" name="Rectángulo 7">
-            <a:extLst>
-              <a:ext uri="{FF2B5EF4-FFF2-40B4-BE49-F238E27FC236}">
-                <a16:creationId xmlns:a16="http://schemas.microsoft.com/office/drawing/2014/main" id="{0CBAC0F3-32FA-916B-CFE3-377F9DCFCE42}"/>
-              </a:ext>
-            </a:extLst>
-          </p:cNvPr>
-          <p:cNvSpPr/>
-          <p:nvPr/>
-        </p:nvSpPr>
+      <p:pic>
+        <p:nvPicPr>
+          <p:cNvPr id="9" name="Imagen 8">
+            <a:extLst>
+              <a:ext uri="{FF2B5EF4-FFF2-40B4-BE49-F238E27FC236}">
+                <a16:creationId xmlns:a16="http://schemas.microsoft.com/office/drawing/2014/main" id="{68D5730F-A420-6660-A7A2-5CC9C00E4406}"/>
+              </a:ext>
+            </a:extLst>
+          </p:cNvPr>
+          <p:cNvPicPr>
+            <a:picLocks noChangeAspect="1"/>
+          </p:cNvPicPr>
+          <p:nvPr/>
+        </p:nvPicPr>
+        <p:blipFill>
+          <a:blip r:embed="rId4"/>
+          <a:stretch>
+            <a:fillRect/>
+          </a:stretch>
+        </p:blipFill>
         <p:spPr>
           <a:xfrm>
-            <a:off x="2313399" y="5321035"/>
-            <a:ext cx="880534" cy="311573"/>
+            <a:off x="6986354" y="1035699"/>
+            <a:ext cx="4587638" cy="5067739"/>
           </a:xfrm>
           <a:prstGeom prst="rect">
             <a:avLst/>
           </a:prstGeom>
+        </p:spPr>
+      </p:pic>
+      <p:sp>
+        <p:nvSpPr>
+          <p:cNvPr id="10" name="Rectángulo 9">
+            <a:extLst>
+              <a:ext uri="{FF2B5EF4-FFF2-40B4-BE49-F238E27FC236}">
+                <a16:creationId xmlns:a16="http://schemas.microsoft.com/office/drawing/2014/main" id="{54ADBBAE-3319-A798-DAF0-2E617B4FDF4E}"/>
+              </a:ext>
+            </a:extLst>
+          </p:cNvPr>
+          <p:cNvSpPr/>
+          <p:nvPr/>
+        </p:nvSpPr>
+        <p:spPr>
+          <a:xfrm>
+            <a:off x="2440501" y="4962986"/>
+            <a:ext cx="1072055" cy="372066"/>
+          </a:xfrm>
+          <a:prstGeom prst="rect">
+            <a:avLst/>
+          </a:prstGeom>
           <a:noFill/>
-          <a:ln w="38100" cap="flat" cmpd="sng" algn="ctr">
-            <a:solidFill>
-              <a:schemeClr val="accent5"/>
+          <a:ln w="28575" cap="flat" cmpd="sng" algn="ctr">
+            <a:solidFill>
+              <a:schemeClr val="accent2"/>
             </a:solidFill>
             <a:prstDash val="solid"/>
             <a:round/>
@@ -11763,7 +11489,7 @@
             <a:scrgbClr r="0" g="0" b="0"/>
           </a:effectRef>
           <a:fontRef idx="minor">
-            <a:schemeClr val="accent5"/>
+            <a:schemeClr val="accent2"/>
           </a:fontRef>
         </p:style>
         <p:txBody>
@@ -11775,51 +11501,22 @@
           </a:p>
         </p:txBody>
       </p:sp>
-      <p:pic>
-        <p:nvPicPr>
-          <p:cNvPr id="17" name="Imagen 16">
-            <a:extLst>
-              <a:ext uri="{FF2B5EF4-FFF2-40B4-BE49-F238E27FC236}">
-                <a16:creationId xmlns:a16="http://schemas.microsoft.com/office/drawing/2014/main" id="{D992860E-DE2E-C958-0AF3-DD9EC5DF8DCA}"/>
-              </a:ext>
-            </a:extLst>
-          </p:cNvPr>
-          <p:cNvPicPr>
-            <a:picLocks noChangeAspect="1"/>
-          </p:cNvPicPr>
-          <p:nvPr/>
-        </p:nvPicPr>
-        <p:blipFill rotWithShape="1">
-          <a:blip r:embed="rId3"/>
-          <a:srcRect l="1068" t="3118" r="840" b="2323"/>
-          <a:stretch/>
-        </p:blipFill>
+      <p:sp>
+        <p:nvSpPr>
+          <p:cNvPr id="11" name="Rectángulo 10">
+            <a:extLst>
+              <a:ext uri="{FF2B5EF4-FFF2-40B4-BE49-F238E27FC236}">
+                <a16:creationId xmlns:a16="http://schemas.microsoft.com/office/drawing/2014/main" id="{48A20834-92E4-38FD-D009-14E800128AFC}"/>
+              </a:ext>
+            </a:extLst>
+          </p:cNvPr>
+          <p:cNvSpPr/>
+          <p:nvPr/>
+        </p:nvSpPr>
         <p:spPr>
           <a:xfrm>
-            <a:off x="4357588" y="1756637"/>
-            <a:ext cx="3562387" cy="3931561"/>
-          </a:xfrm>
-          <a:prstGeom prst="rect">
-            <a:avLst/>
-          </a:prstGeom>
-        </p:spPr>
-      </p:pic>
-      <p:sp>
-        <p:nvSpPr>
-          <p:cNvPr id="18" name="Rectángulo 17">
-            <a:extLst>
-              <a:ext uri="{FF2B5EF4-FFF2-40B4-BE49-F238E27FC236}">
-                <a16:creationId xmlns:a16="http://schemas.microsoft.com/office/drawing/2014/main" id="{C64D4F76-8436-45A9-3BCE-8C9F8A7E4524}"/>
-              </a:ext>
-            </a:extLst>
-          </p:cNvPr>
-          <p:cNvSpPr/>
-          <p:nvPr/>
-        </p:nvSpPr>
-        <p:spPr>
-          <a:xfrm>
-            <a:off x="4962984" y="1917086"/>
-            <a:ext cx="176574" cy="138737"/>
+            <a:off x="7226913" y="1734207"/>
+            <a:ext cx="1336916" cy="384679"/>
           </a:xfrm>
           <a:prstGeom prst="rect">
             <a:avLst/>
@@ -11860,10 +11557,10 @@
       </p:sp>
       <p:sp>
         <p:nvSpPr>
-          <p:cNvPr id="19" name="Rectángulo 18">
-            <a:extLst>
-              <a:ext uri="{FF2B5EF4-FFF2-40B4-BE49-F238E27FC236}">
-                <a16:creationId xmlns:a16="http://schemas.microsoft.com/office/drawing/2014/main" id="{34C86429-806A-5BC6-4EA0-7A6FB3B2D5D0}"/>
+          <p:cNvPr id="12" name="Rectángulo 11">
+            <a:extLst>
+              <a:ext uri="{FF2B5EF4-FFF2-40B4-BE49-F238E27FC236}">
+                <a16:creationId xmlns:a16="http://schemas.microsoft.com/office/drawing/2014/main" id="{553111CE-1A2E-7D54-5F7E-F5C56671EDA1}"/>
               </a:ext>
             </a:extLst>
           </p:cNvPr>
@@ -11872,14 +11569,14 @@
         </p:nvSpPr>
         <p:spPr>
           <a:xfrm>
-            <a:off x="6728722" y="3384856"/>
-            <a:ext cx="1103586" cy="165538"/>
+            <a:off x="8614279" y="1538714"/>
+            <a:ext cx="1292772" cy="384679"/>
           </a:xfrm>
           <a:prstGeom prst="rect">
             <a:avLst/>
           </a:prstGeom>
           <a:noFill/>
-          <a:ln w="9525" cap="flat" cmpd="sng" algn="ctr">
+          <a:ln w="28575" cap="flat" cmpd="sng" algn="ctr">
             <a:solidFill>
               <a:schemeClr val="accent6"/>
             </a:solidFill>
@@ -11912,197 +11609,22 @@
           </a:p>
         </p:txBody>
       </p:sp>
-      <p:cxnSp>
-        <p:nvCxnSpPr>
-          <p:cNvPr id="21" name="Conector: angular 20">
-            <a:extLst>
-              <a:ext uri="{FF2B5EF4-FFF2-40B4-BE49-F238E27FC236}">
-                <a16:creationId xmlns:a16="http://schemas.microsoft.com/office/drawing/2014/main" id="{0658B271-525B-ABB0-B49C-D484DE9E267A}"/>
-              </a:ext>
-            </a:extLst>
-          </p:cNvPr>
-          <p:cNvCxnSpPr>
-            <a:stCxn id="8" idx="3"/>
-            <a:endCxn id="18" idx="1"/>
-          </p:cNvCxnSpPr>
-          <p:nvPr/>
-        </p:nvCxnSpPr>
-        <p:spPr>
-          <a:xfrm flipV="1">
-            <a:off x="3193933" y="1986455"/>
-            <a:ext cx="1769051" cy="3490367"/>
-          </a:xfrm>
-          <a:prstGeom prst="bentConnector3">
-            <a:avLst/>
-          </a:prstGeom>
-          <a:ln w="28575">
-            <a:solidFill>
-              <a:schemeClr val="accent6">
-                <a:lumMod val="75000"/>
-              </a:schemeClr>
-            </a:solidFill>
-            <a:tailEnd type="triangle"/>
-          </a:ln>
-        </p:spPr>
-        <p:style>
-          <a:lnRef idx="1">
-            <a:schemeClr val="accent1"/>
-          </a:lnRef>
-          <a:fillRef idx="0">
-            <a:schemeClr val="accent1"/>
-          </a:fillRef>
-          <a:effectRef idx="0">
-            <a:schemeClr val="accent1"/>
-          </a:effectRef>
-          <a:fontRef idx="minor">
-            <a:schemeClr val="tx1"/>
-          </a:fontRef>
-        </p:style>
-      </p:cxnSp>
-      <p:cxnSp>
-        <p:nvCxnSpPr>
-          <p:cNvPr id="23" name="Conector: angular 22">
-            <a:extLst>
-              <a:ext uri="{FF2B5EF4-FFF2-40B4-BE49-F238E27FC236}">
-                <a16:creationId xmlns:a16="http://schemas.microsoft.com/office/drawing/2014/main" id="{B42E5BE1-BFE4-FB9B-6D80-3A83C840DBDC}"/>
-              </a:ext>
-            </a:extLst>
-          </p:cNvPr>
-          <p:cNvCxnSpPr>
-            <a:stCxn id="18" idx="3"/>
-            <a:endCxn id="19" idx="1"/>
-          </p:cNvCxnSpPr>
-          <p:nvPr/>
-        </p:nvCxnSpPr>
+      <p:sp>
+        <p:nvSpPr>
+          <p:cNvPr id="13" name="Rectángulo 12">
+            <a:extLst>
+              <a:ext uri="{FF2B5EF4-FFF2-40B4-BE49-F238E27FC236}">
+                <a16:creationId xmlns:a16="http://schemas.microsoft.com/office/drawing/2014/main" id="{686A8C6E-87F4-7C3C-C7A1-8ADBAFA4C7FC}"/>
+              </a:ext>
+            </a:extLst>
+          </p:cNvPr>
+          <p:cNvSpPr/>
+          <p:nvPr/>
+        </p:nvSpPr>
         <p:spPr>
           <a:xfrm>
-            <a:off x="5139558" y="1986455"/>
-            <a:ext cx="1589164" cy="1481170"/>
-          </a:xfrm>
-          <a:prstGeom prst="bentConnector3">
-            <a:avLst>
-              <a:gd name="adj1" fmla="val 29365"/>
-            </a:avLst>
-          </a:prstGeom>
-          <a:ln w="28575">
-            <a:tailEnd type="triangle"/>
-          </a:ln>
-        </p:spPr>
-        <p:style>
-          <a:lnRef idx="1">
-            <a:schemeClr val="accent6"/>
-          </a:lnRef>
-          <a:fillRef idx="0">
-            <a:schemeClr val="accent6"/>
-          </a:fillRef>
-          <a:effectRef idx="0">
-            <a:schemeClr val="accent6"/>
-          </a:effectRef>
-          <a:fontRef idx="minor">
-            <a:schemeClr val="tx1"/>
-          </a:fontRef>
-        </p:style>
-      </p:cxnSp>
-      <p:pic>
-        <p:nvPicPr>
-          <p:cNvPr id="26" name="Imagen 25">
-            <a:extLst>
-              <a:ext uri="{FF2B5EF4-FFF2-40B4-BE49-F238E27FC236}">
-                <a16:creationId xmlns:a16="http://schemas.microsoft.com/office/drawing/2014/main" id="{5175ACD0-2054-4123-8351-3C25923CA05B}"/>
-              </a:ext>
-            </a:extLst>
-          </p:cNvPr>
-          <p:cNvPicPr>
-            <a:picLocks noChangeAspect="1"/>
-          </p:cNvPicPr>
-          <p:nvPr/>
-        </p:nvPicPr>
-        <p:blipFill>
-          <a:blip r:embed="rId4"/>
-          <a:stretch>
-            <a:fillRect/>
-          </a:stretch>
-        </p:blipFill>
-        <p:spPr>
-          <a:xfrm>
-            <a:off x="8138982" y="1756637"/>
-            <a:ext cx="3633142" cy="3931561"/>
-          </a:xfrm>
-          <a:prstGeom prst="rect">
-            <a:avLst/>
-          </a:prstGeom>
-        </p:spPr>
-      </p:pic>
-      <p:sp>
-        <p:nvSpPr>
-          <p:cNvPr id="27" name="Rectángulo 26">
-            <a:extLst>
-              <a:ext uri="{FF2B5EF4-FFF2-40B4-BE49-F238E27FC236}">
-                <a16:creationId xmlns:a16="http://schemas.microsoft.com/office/drawing/2014/main" id="{CB9E988D-D5B5-D175-BFB7-2A8DF0785C1A}"/>
-              </a:ext>
-            </a:extLst>
-          </p:cNvPr>
-          <p:cNvSpPr/>
-          <p:nvPr/>
-        </p:nvSpPr>
-        <p:spPr>
-          <a:xfrm>
-            <a:off x="9257511" y="2680137"/>
-            <a:ext cx="2295459" cy="107206"/>
-          </a:xfrm>
-          <a:prstGeom prst="rect">
-            <a:avLst/>
-          </a:prstGeom>
-          <a:noFill/>
-          <a:ln w="19050" cap="flat" cmpd="sng" algn="ctr">
-            <a:solidFill>
-              <a:schemeClr val="accent6"/>
-            </a:solidFill>
-            <a:prstDash val="solid"/>
-            <a:round/>
-            <a:headEnd type="none" w="med" len="med"/>
-            <a:tailEnd type="none" w="med" len="med"/>
-          </a:ln>
-        </p:spPr>
-        <p:style>
-          <a:lnRef idx="0">
-            <a:scrgbClr r="0" g="0" b="0"/>
-          </a:lnRef>
-          <a:fillRef idx="0">
-            <a:scrgbClr r="0" g="0" b="0"/>
-          </a:fillRef>
-          <a:effectRef idx="0">
-            <a:scrgbClr r="0" g="0" b="0"/>
-          </a:effectRef>
-          <a:fontRef idx="minor">
-            <a:schemeClr val="accent6"/>
-          </a:fontRef>
-        </p:style>
-        <p:txBody>
-          <a:bodyPr rtlCol="0" anchor="ctr"/>
-          <a:lstStyle/>
-          <a:p>
-            <a:pPr algn="ctr"/>
-            <a:endParaRPr lang="es-ES"/>
-          </a:p>
-        </p:txBody>
-      </p:sp>
-      <p:sp>
-        <p:nvSpPr>
-          <p:cNvPr id="28" name="Rectángulo 27">
-            <a:extLst>
-              <a:ext uri="{FF2B5EF4-FFF2-40B4-BE49-F238E27FC236}">
-                <a16:creationId xmlns:a16="http://schemas.microsoft.com/office/drawing/2014/main" id="{F392A525-3DF6-2F2A-952C-7D0F3BA52B3F}"/>
-              </a:ext>
-            </a:extLst>
-          </p:cNvPr>
-          <p:cNvSpPr/>
-          <p:nvPr/>
-        </p:nvSpPr>
-        <p:spPr>
-          <a:xfrm>
-            <a:off x="8138982" y="2301765"/>
-            <a:ext cx="998711" cy="145043"/>
+            <a:off x="9976419" y="1375923"/>
+            <a:ext cx="1292772" cy="384679"/>
           </a:xfrm>
           <a:prstGeom prst="rect">
             <a:avLst/>
@@ -12110,9 +11632,7 @@
           <a:noFill/>
           <a:ln w="28575">
             <a:solidFill>
-              <a:schemeClr val="accent6">
-                <a:lumMod val="75000"/>
-              </a:schemeClr>
+              <a:schemeClr val="accent1"/>
             </a:solidFill>
           </a:ln>
         </p:spPr>
@@ -12141,52 +11661,116 @@
           </a:p>
         </p:txBody>
       </p:sp>
-      <p:cxnSp>
-        <p:nvCxnSpPr>
-          <p:cNvPr id="30" name="Conector: angular 29">
-            <a:extLst>
-              <a:ext uri="{FF2B5EF4-FFF2-40B4-BE49-F238E27FC236}">
-                <a16:creationId xmlns:a16="http://schemas.microsoft.com/office/drawing/2014/main" id="{A4175B14-E69B-EEAC-A841-41238CCA3E0E}"/>
-              </a:ext>
-            </a:extLst>
-          </p:cNvPr>
-          <p:cNvCxnSpPr>
-            <a:stCxn id="19" idx="3"/>
-            <a:endCxn id="28" idx="1"/>
-          </p:cNvCxnSpPr>
-          <p:nvPr/>
-        </p:nvCxnSpPr>
+      <p:sp>
+        <p:nvSpPr>
+          <p:cNvPr id="14" name="Rectángulo 13">
+            <a:extLst>
+              <a:ext uri="{FF2B5EF4-FFF2-40B4-BE49-F238E27FC236}">
+                <a16:creationId xmlns:a16="http://schemas.microsoft.com/office/drawing/2014/main" id="{CB95AB96-EFE7-4939-B367-2CEBC10556D9}"/>
+              </a:ext>
+            </a:extLst>
+          </p:cNvPr>
+          <p:cNvSpPr/>
+          <p:nvPr/>
+        </p:nvSpPr>
         <p:spPr>
-          <a:xfrm flipV="1">
-            <a:off x="7832308" y="2374287"/>
-            <a:ext cx="306674" cy="1093338"/>
-          </a:xfrm>
-          <a:prstGeom prst="bentConnector3">
-            <a:avLst/>
-          </a:prstGeom>
+          <a:xfrm>
+            <a:off x="9976419" y="1760602"/>
+            <a:ext cx="1292772" cy="384679"/>
+          </a:xfrm>
+          <a:prstGeom prst="rect">
+            <a:avLst/>
+          </a:prstGeom>
+          <a:noFill/>
           <a:ln w="28575">
-            <a:tailEnd type="triangle"/>
+            <a:solidFill>
+              <a:srgbClr val="00B0F0"/>
+            </a:solidFill>
           </a:ln>
         </p:spPr>
         <p:style>
-          <a:lnRef idx="1">
-            <a:schemeClr val="accent6"/>
+          <a:lnRef idx="2">
+            <a:schemeClr val="accent1">
+              <a:shade val="15000"/>
+            </a:schemeClr>
+          </a:lnRef>
+          <a:fillRef idx="1">
+            <a:schemeClr val="accent1"/>
+          </a:fillRef>
+          <a:effectRef idx="0">
+            <a:schemeClr val="accent1"/>
+          </a:effectRef>
+          <a:fontRef idx="minor">
+            <a:schemeClr val="lt1"/>
+          </a:fontRef>
+        </p:style>
+        <p:txBody>
+          <a:bodyPr rtlCol="0" anchor="ctr"/>
+          <a:lstStyle/>
+          <a:p>
+            <a:pPr algn="ctr"/>
+            <a:endParaRPr lang="es-ES"/>
+          </a:p>
+        </p:txBody>
+      </p:sp>
+      <p:sp>
+        <p:nvSpPr>
+          <p:cNvPr id="15" name="Rectángulo 14">
+            <a:extLst>
+              <a:ext uri="{FF2B5EF4-FFF2-40B4-BE49-F238E27FC236}">
+                <a16:creationId xmlns:a16="http://schemas.microsoft.com/office/drawing/2014/main" id="{CC710657-50FE-70B2-7A4C-3C1136E04508}"/>
+              </a:ext>
+            </a:extLst>
+          </p:cNvPr>
+          <p:cNvSpPr/>
+          <p:nvPr/>
+        </p:nvSpPr>
+        <p:spPr>
+          <a:xfrm>
+            <a:off x="7088177" y="2226691"/>
+            <a:ext cx="4307139" cy="1670545"/>
+          </a:xfrm>
+          <a:prstGeom prst="rect">
+            <a:avLst/>
+          </a:prstGeom>
+          <a:noFill/>
+          <a:ln w="28575" cap="flat" cmpd="sng" algn="ctr">
+            <a:solidFill>
+              <a:schemeClr val="accent5"/>
+            </a:solidFill>
+            <a:prstDash val="solid"/>
+            <a:round/>
+            <a:headEnd type="none" w="med" len="med"/>
+            <a:tailEnd type="none" w="med" len="med"/>
+          </a:ln>
+        </p:spPr>
+        <p:style>
+          <a:lnRef idx="0">
+            <a:scrgbClr r="0" g="0" b="0"/>
           </a:lnRef>
           <a:fillRef idx="0">
-            <a:schemeClr val="accent6"/>
+            <a:scrgbClr r="0" g="0" b="0"/>
           </a:fillRef>
           <a:effectRef idx="0">
-            <a:schemeClr val="accent6"/>
+            <a:scrgbClr r="0" g="0" b="0"/>
           </a:effectRef>
           <a:fontRef idx="minor">
-            <a:schemeClr val="tx1"/>
+            <a:schemeClr val="accent5"/>
           </a:fontRef>
         </p:style>
-      </p:cxnSp>
+        <p:txBody>
+          <a:bodyPr rtlCol="0" anchor="ctr"/>
+          <a:lstStyle/>
+          <a:p>
+            <a:pPr algn="ctr"/>
+            <a:endParaRPr lang="es-ES"/>
+          </a:p>
+        </p:txBody>
+      </p:sp>
     </p:spTree>
     <p:extLst>
       <p:ext uri="{BB962C8B-B14F-4D97-AF65-F5344CB8AC3E}">
-        <p14:creationId xmlns:p14="http://schemas.microsoft.com/office/powerpoint/2010/main" val="3568077784"/>
+        <p14:creationId xmlns:p14="http://schemas.microsoft.com/office/powerpoint/2010/main" val="823993469"/>
       </p:ext>
     </p:extLst>
   </p:cSld>
@@ -12218,7 +11802,7 @@
           <p:cNvPr id="2" name="Título 1">
             <a:extLst>
               <a:ext uri="{FF2B5EF4-FFF2-40B4-BE49-F238E27FC236}">
-                <a16:creationId xmlns:a16="http://schemas.microsoft.com/office/drawing/2014/main" id="{FBB01069-074F-AF35-AAF9-00C4260CFF47}"/>
+                <a16:creationId xmlns:a16="http://schemas.microsoft.com/office/drawing/2014/main" id="{8AFDB66D-3D0E-281D-8A93-DA6E42FF540D}"/>
               </a:ext>
             </a:extLst>
           </p:cNvPr>
@@ -12231,29 +11815,29 @@
         </p:nvSpPr>
         <p:spPr>
           <a:xfrm>
-            <a:off x="975360" y="795528"/>
-            <a:ext cx="10241280" cy="528775"/>
+            <a:off x="618008" y="499135"/>
+            <a:ext cx="10730010" cy="705350"/>
           </a:xfrm>
         </p:spPr>
         <p:txBody>
           <a:bodyPr>
-            <a:normAutofit fontScale="90000"/>
+            <a:normAutofit/>
           </a:bodyPr>
           <a:lstStyle/>
           <a:p>
             <a:r>
               <a:rPr lang="es-ES" dirty="0"/>
-              <a:t>NORMALIZACIÓN EN INTENSIDAD</a:t>
-            </a:r>
-          </a:p>
-        </p:txBody>
-      </p:sp>
-      <p:sp>
-        <p:nvSpPr>
-          <p:cNvPr id="3" name="CuadroTexto 2">
-            <a:extLst>
-              <a:ext uri="{FF2B5EF4-FFF2-40B4-BE49-F238E27FC236}">
-                <a16:creationId xmlns:a16="http://schemas.microsoft.com/office/drawing/2014/main" id="{B9B0CAFE-B569-2B02-6F49-2FD4C6AA09F1}"/>
+              <a:t>SPM (¿LO SABÍAS?)</a:t>
+            </a:r>
+          </a:p>
+        </p:txBody>
+      </p:sp>
+      <p:sp>
+        <p:nvSpPr>
+          <p:cNvPr id="4" name="CuadroTexto 3">
+            <a:extLst>
+              <a:ext uri="{FF2B5EF4-FFF2-40B4-BE49-F238E27FC236}">
+                <a16:creationId xmlns:a16="http://schemas.microsoft.com/office/drawing/2014/main" id="{F09FAD2E-7DFD-F4D1-D2B4-2F967D6DC49A}"/>
               </a:ext>
             </a:extLst>
           </p:cNvPr>
@@ -12262,8 +11846,8 @@
         </p:nvSpPr>
         <p:spPr>
           <a:xfrm>
-            <a:off x="5797189" y="1508409"/>
-            <a:ext cx="2325861" cy="307777"/>
+            <a:off x="609372" y="1349528"/>
+            <a:ext cx="9985056" cy="2031325"/>
           </a:xfrm>
           <a:prstGeom prst="rect">
             <a:avLst/>
@@ -12271,237 +11855,124 @@
           <a:noFill/>
         </p:spPr>
         <p:txBody>
-          <a:bodyPr wrap="square">
+          <a:bodyPr wrap="square" rtlCol="0">
             <a:spAutoFit/>
           </a:bodyPr>
           <a:lstStyle/>
           <a:p>
-            <a:r>
-              <a:rPr lang="es-ES" altLang="es-ES" sz="1400" b="1" dirty="0">
-                <a:solidFill>
-                  <a:srgbClr val="FF0000"/>
-                </a:solidFill>
+            <a:pPr marL="285750" indent="-285750">
+              <a:buFont typeface="Arial" panose="020B0604020202020204" pitchFamily="34" charset="0"/>
+              <a:buChar char="•"/>
+            </a:pPr>
+            <a:r>
+              <a:rPr lang="es-ES" dirty="0"/>
+              <a:t>Permite </a:t>
+            </a:r>
+            <a:r>
+              <a:rPr lang="es-ES" dirty="0" err="1"/>
+              <a:t>scriptar</a:t>
+            </a:r>
+            <a:r>
+              <a:rPr lang="es-ES" dirty="0"/>
+              <a:t> a través de Matlab</a:t>
+            </a:r>
+          </a:p>
+          <a:p>
+            <a:pPr marL="285750" indent="-285750">
+              <a:buFont typeface="Arial" panose="020B0604020202020204" pitchFamily="34" charset="0"/>
+              <a:buChar char="•"/>
+            </a:pPr>
+            <a:r>
+              <a:rPr lang="es-ES" dirty="0"/>
+              <a:t>Si no tienes Matlab, existe una versión </a:t>
+            </a:r>
+            <a:r>
+              <a:rPr lang="es-ES" u="sng" dirty="0" err="1"/>
+              <a:t>standalone</a:t>
+            </a:r>
+            <a:r>
+              <a:rPr lang="es-ES" dirty="0"/>
+              <a:t>: </a:t>
+            </a:r>
+            <a:r>
+              <a:rPr lang="es-ES" dirty="0">
+                <a:hlinkClick r:id="rId2"/>
               </a:rPr>
-              <a:t>Muy importante en PET!</a:t>
-            </a:r>
-            <a:endParaRPr lang="es-ES" sz="1400" b="1" dirty="0">
-              <a:solidFill>
-                <a:srgbClr val="FF0000"/>
-              </a:solidFill>
-            </a:endParaRPr>
+              <a:t>https://en.wikibooks.org/wiki/SPM/Standalone</a:t>
+            </a:r>
+            <a:r>
+              <a:rPr lang="es-ES" dirty="0"/>
+              <a:t> </a:t>
+            </a:r>
+          </a:p>
+          <a:p>
+            <a:pPr marL="285750" indent="-285750">
+              <a:buFont typeface="Arial" panose="020B0604020202020204" pitchFamily="34" charset="0"/>
+              <a:buChar char="•"/>
+            </a:pPr>
+            <a:r>
+              <a:rPr lang="es-ES" dirty="0"/>
+              <a:t>Esta versión </a:t>
+            </a:r>
+            <a:r>
+              <a:rPr lang="es-ES" b="1" u="sng" dirty="0"/>
+              <a:t>tiene solo el SPM básico</a:t>
+            </a:r>
+            <a:r>
+              <a:rPr lang="es-ES" dirty="0"/>
+              <a:t>, sin embargo, si quieres crear tu propio </a:t>
+            </a:r>
+            <a:r>
+              <a:rPr lang="es-ES" dirty="0" err="1"/>
+              <a:t>standalone</a:t>
+            </a:r>
+            <a:r>
+              <a:rPr lang="es-ES" dirty="0"/>
+              <a:t> con los </a:t>
+            </a:r>
+            <a:r>
+              <a:rPr lang="es-ES" dirty="0" err="1"/>
+              <a:t>toolbox</a:t>
+            </a:r>
+            <a:r>
+              <a:rPr lang="es-ES" dirty="0"/>
+              <a:t> que necesites, </a:t>
+            </a:r>
+            <a:r>
+              <a:rPr lang="es-ES" b="1" u="sng" dirty="0"/>
+              <a:t>puedes crearte tu propia versión </a:t>
+            </a:r>
+            <a:r>
+              <a:rPr lang="es-ES" b="1" u="sng" dirty="0" err="1"/>
+              <a:t>standalone</a:t>
+            </a:r>
+            <a:r>
+              <a:rPr lang="es-ES" b="1" u="sng" dirty="0"/>
+              <a:t> </a:t>
+            </a:r>
+            <a:r>
+              <a:rPr lang="es-ES" dirty="0"/>
+              <a:t>utilizando la siguiente función dentro de SPM:</a:t>
+            </a:r>
+          </a:p>
+          <a:p>
+            <a:pPr marL="285750" indent="-285750">
+              <a:buFont typeface="Arial" panose="020B0604020202020204" pitchFamily="34" charset="0"/>
+              <a:buChar char="•"/>
+            </a:pPr>
+            <a:endParaRPr lang="es-ES" dirty="0"/>
+          </a:p>
+          <a:p>
+            <a:endParaRPr lang="es-ES" dirty="0"/>
           </a:p>
         </p:txBody>
       </p:sp>
       <p:pic>
         <p:nvPicPr>
-          <p:cNvPr id="4" name="Picture 2" descr="Fig 1">
-            <a:extLst>
-              <a:ext uri="{FF2B5EF4-FFF2-40B4-BE49-F238E27FC236}">
-                <a16:creationId xmlns:a16="http://schemas.microsoft.com/office/drawing/2014/main" id="{24EC08FA-DC90-BB61-4121-DD1E36BEED70}"/>
-              </a:ext>
-            </a:extLst>
-          </p:cNvPr>
-          <p:cNvPicPr>
-            <a:picLocks noChangeAspect="1" noChangeArrowheads="1"/>
-          </p:cNvPicPr>
-          <p:nvPr/>
-        </p:nvPicPr>
-        <p:blipFill>
-          <a:blip r:embed="rId2">
-            <a:extLst>
-              <a:ext uri="{28A0092B-C50C-407E-A947-70E740481C1C}">
-                <a14:useLocalDpi xmlns:a14="http://schemas.microsoft.com/office/drawing/2010/main" val="0"/>
-              </a:ext>
-            </a:extLst>
-          </a:blip>
-          <a:srcRect/>
-          <a:stretch>
-            <a:fillRect/>
-          </a:stretch>
-        </p:blipFill>
-        <p:spPr bwMode="auto">
-          <a:xfrm>
-            <a:off x="1498823" y="1582858"/>
-            <a:ext cx="2924008" cy="3338191"/>
-          </a:xfrm>
-          <a:prstGeom prst="rect">
-            <a:avLst/>
-          </a:prstGeom>
-          <a:noFill/>
-          <a:extLst>
-            <a:ext uri="{909E8E84-426E-40DD-AFC4-6F175D3DCCD1}">
-              <a14:hiddenFill xmlns:a14="http://schemas.microsoft.com/office/drawing/2010/main">
-                <a:solidFill>
-                  <a:srgbClr val="FFFFFF"/>
-                </a:solidFill>
-              </a14:hiddenFill>
-            </a:ext>
-          </a:extLst>
-        </p:spPr>
-      </p:pic>
-      <p:sp>
-        <p:nvSpPr>
-          <p:cNvPr id="5" name="30 Rectángulo">
-            <a:extLst>
-              <a:ext uri="{FF2B5EF4-FFF2-40B4-BE49-F238E27FC236}">
-                <a16:creationId xmlns:a16="http://schemas.microsoft.com/office/drawing/2014/main" id="{157C497C-D90B-1C09-A882-E79631D5F852}"/>
-              </a:ext>
-            </a:extLst>
-          </p:cNvPr>
-          <p:cNvSpPr/>
-          <p:nvPr/>
-        </p:nvSpPr>
-        <p:spPr>
-          <a:xfrm>
-            <a:off x="5797189" y="1878481"/>
-            <a:ext cx="5843475" cy="815608"/>
-          </a:xfrm>
-          <a:prstGeom prst="rect">
-            <a:avLst/>
-          </a:prstGeom>
-        </p:spPr>
-        <p:txBody>
-          <a:bodyPr wrap="square">
-            <a:spAutoFit/>
-          </a:bodyPr>
-          <a:lstStyle/>
-          <a:p>
-            <a:pPr>
-              <a:spcAft>
-                <a:spcPts val="600"/>
-              </a:spcAft>
-            </a:pPr>
-            <a:r>
-              <a:rPr lang="es-ES" altLang="es-ES" sz="1400" b="1" dirty="0">
-                <a:solidFill>
-                  <a:srgbClr val="002060"/>
-                </a:solidFill>
-              </a:rPr>
-              <a:t>Selección de una región de referencia</a:t>
-            </a:r>
-            <a:endParaRPr lang="es-ES_tradnl" altLang="es-ES" sz="1400" dirty="0">
-              <a:solidFill>
-                <a:srgbClr val="002060"/>
-              </a:solidFill>
-            </a:endParaRPr>
-          </a:p>
-          <a:p>
-            <a:pPr marL="742932" lvl="1" indent="-285744">
-              <a:buFont typeface="Wingdings" panose="05000000000000000000" pitchFamily="2" charset="2"/>
-              <a:buChar char="ü"/>
-            </a:pPr>
-            <a:r>
-              <a:rPr lang="es-ES_tradnl" altLang="es-ES" sz="1400" dirty="0">
-                <a:solidFill>
-                  <a:srgbClr val="002060"/>
-                </a:solidFill>
-              </a:rPr>
-              <a:t>Se generan biomarcadores relativos a una región sin cambios</a:t>
-            </a:r>
-          </a:p>
-          <a:p>
-            <a:pPr marL="742932" lvl="1" indent="-285744">
-              <a:buFont typeface="Wingdings" panose="05000000000000000000" pitchFamily="2" charset="2"/>
-              <a:buChar char="ü"/>
-            </a:pPr>
-            <a:r>
-              <a:rPr lang="es-ES_tradnl" altLang="es-ES" sz="1400" dirty="0">
-                <a:solidFill>
-                  <a:srgbClr val="FF0000"/>
-                </a:solidFill>
-              </a:rPr>
-              <a:t>Seleccionar la región adecuada es complicado</a:t>
-            </a:r>
-          </a:p>
-        </p:txBody>
-      </p:sp>
-      <p:sp>
-        <p:nvSpPr>
-          <p:cNvPr id="6" name="30 Rectángulo">
-            <a:extLst>
-              <a:ext uri="{FF2B5EF4-FFF2-40B4-BE49-F238E27FC236}">
-                <a16:creationId xmlns:a16="http://schemas.microsoft.com/office/drawing/2014/main" id="{CF94C1FB-B08E-9096-0CC3-2941B61F82BB}"/>
-              </a:ext>
-            </a:extLst>
-          </p:cNvPr>
-          <p:cNvSpPr/>
-          <p:nvPr/>
-        </p:nvSpPr>
-        <p:spPr>
-          <a:xfrm>
-            <a:off x="5797189" y="2817976"/>
-            <a:ext cx="5457257" cy="1031051"/>
-          </a:xfrm>
-          <a:prstGeom prst="rect">
-            <a:avLst/>
-          </a:prstGeom>
-        </p:spPr>
-        <p:txBody>
-          <a:bodyPr wrap="square">
-            <a:spAutoFit/>
-          </a:bodyPr>
-          <a:lstStyle/>
-          <a:p>
-            <a:pPr>
-              <a:spcAft>
-                <a:spcPts val="600"/>
-              </a:spcAft>
-            </a:pPr>
-            <a:r>
-              <a:rPr lang="es-ES" altLang="es-ES" sz="1400" b="1" dirty="0">
-                <a:solidFill>
-                  <a:srgbClr val="002060"/>
-                </a:solidFill>
-              </a:rPr>
-              <a:t>Normalización mediante un factor de escala global</a:t>
-            </a:r>
-            <a:endParaRPr lang="es-ES_tradnl" altLang="es-ES" sz="1400" dirty="0">
-              <a:solidFill>
-                <a:srgbClr val="002060"/>
-              </a:solidFill>
-            </a:endParaRPr>
-          </a:p>
-          <a:p>
-            <a:pPr marL="742932" lvl="1" indent="-285744">
-              <a:buFont typeface="Wingdings" panose="05000000000000000000" pitchFamily="2" charset="2"/>
-              <a:buChar char="ü"/>
-            </a:pPr>
-            <a:r>
-              <a:rPr lang="es-ES_tradnl" altLang="es-ES" sz="1400" dirty="0">
-                <a:solidFill>
-                  <a:srgbClr val="002060"/>
-                </a:solidFill>
-              </a:rPr>
-              <a:t>Se multiplica/divide toda la imagen por un mismo factor (máximo, media…)</a:t>
-            </a:r>
-          </a:p>
-          <a:p>
-            <a:pPr marL="742932" lvl="1" indent="-285744">
-              <a:buFont typeface="Wingdings" panose="05000000000000000000" pitchFamily="2" charset="2"/>
-              <a:buChar char="ü"/>
-            </a:pPr>
-            <a:r>
-              <a:rPr lang="es-ES_tradnl" altLang="es-ES" sz="1400" dirty="0">
-                <a:solidFill>
-                  <a:srgbClr val="FF0000"/>
-                </a:solidFill>
-              </a:rPr>
-              <a:t>No funciona cuando hay diferencias grandes en la distribución</a:t>
-            </a:r>
-            <a:endParaRPr lang="es-ES" altLang="es-ES" sz="1400" dirty="0">
-              <a:solidFill>
-                <a:srgbClr val="FF0000"/>
-              </a:solidFill>
-            </a:endParaRPr>
-          </a:p>
-        </p:txBody>
-      </p:sp>
-      <p:pic>
-        <p:nvPicPr>
-          <p:cNvPr id="8" name="Imagen 7">
-            <a:extLst>
-              <a:ext uri="{FF2B5EF4-FFF2-40B4-BE49-F238E27FC236}">
-                <a16:creationId xmlns:a16="http://schemas.microsoft.com/office/drawing/2014/main" id="{5CA97366-A6DC-8718-A2AC-10150F278C21}"/>
+          <p:cNvPr id="6" name="Imagen 5">
+            <a:extLst>
+              <a:ext uri="{FF2B5EF4-FFF2-40B4-BE49-F238E27FC236}">
+                <a16:creationId xmlns:a16="http://schemas.microsoft.com/office/drawing/2014/main" id="{B5A2D75A-9F34-861C-5751-F50BDD79594F}"/>
               </a:ext>
             </a:extLst>
           </p:cNvPr>
@@ -12510,176 +11981,69 @@
           </p:cNvPicPr>
           <p:nvPr/>
         </p:nvPicPr>
-        <p:blipFill rotWithShape="1">
+        <p:blipFill>
           <a:blip r:embed="rId3"/>
-          <a:srcRect t="42878" b="28523"/>
-          <a:stretch/>
-        </p:blipFill>
-        <p:spPr>
-          <a:xfrm>
-            <a:off x="6119345" y="4103363"/>
-            <a:ext cx="4812943" cy="1520106"/>
-          </a:xfrm>
-          <a:prstGeom prst="rect">
-            <a:avLst/>
-          </a:prstGeom>
-          <a:ln w="38100" cap="sq">
-            <a:solidFill>
-              <a:schemeClr val="accent1"/>
-            </a:solidFill>
-            <a:prstDash val="solid"/>
-            <a:miter lim="800000"/>
-          </a:ln>
-          <a:effectLst>
-            <a:outerShdw blurRad="50800" dist="38100" dir="2700000" algn="tl" rotWithShape="0">
-              <a:srgbClr val="000000">
-                <a:alpha val="43000"/>
-              </a:srgbClr>
-            </a:outerShdw>
-          </a:effectLst>
-        </p:spPr>
-      </p:pic>
-      <p:sp>
-        <p:nvSpPr>
-          <p:cNvPr id="9" name="CuadroTexto 8">
-            <a:extLst>
-              <a:ext uri="{FF2B5EF4-FFF2-40B4-BE49-F238E27FC236}">
-                <a16:creationId xmlns:a16="http://schemas.microsoft.com/office/drawing/2014/main" id="{C2F7C4F0-6F3D-00A3-C9FC-773727430A68}"/>
-              </a:ext>
-            </a:extLst>
-          </p:cNvPr>
-          <p:cNvSpPr txBox="1"/>
-          <p:nvPr/>
-        </p:nvSpPr>
-        <p:spPr>
-          <a:xfrm>
-            <a:off x="7004630" y="5859308"/>
-            <a:ext cx="3042371" cy="369332"/>
-          </a:xfrm>
-          <a:prstGeom prst="rect">
-            <a:avLst/>
-          </a:prstGeom>
-          <a:noFill/>
-          <a:ln>
-            <a:solidFill>
-              <a:schemeClr val="accent1"/>
-            </a:solidFill>
-          </a:ln>
-        </p:spPr>
-        <p:txBody>
-          <a:bodyPr wrap="none" rtlCol="0">
-            <a:spAutoFit/>
-          </a:bodyPr>
-          <a:lstStyle/>
-          <a:p>
-            <a:r>
-              <a:rPr lang="es-ES" dirty="0"/>
-              <a:t>❗Opciones por defecto SPM</a:t>
-            </a:r>
-          </a:p>
-        </p:txBody>
-      </p:sp>
-      <p:pic>
-        <p:nvPicPr>
-          <p:cNvPr id="10" name="Imagen 9">
-            <a:extLst>
-              <a:ext uri="{FF2B5EF4-FFF2-40B4-BE49-F238E27FC236}">
-                <a16:creationId xmlns:a16="http://schemas.microsoft.com/office/drawing/2014/main" id="{5EBA2AEE-6280-2293-AB3E-7244AD3D0035}"/>
-              </a:ext>
-            </a:extLst>
-          </p:cNvPr>
-          <p:cNvPicPr>
-            <a:picLocks noChangeAspect="1"/>
-          </p:cNvPicPr>
-          <p:nvPr/>
-        </p:nvPicPr>
-        <p:blipFill>
-          <a:blip r:embed="rId4"/>
           <a:stretch>
             <a:fillRect/>
           </a:stretch>
         </p:blipFill>
         <p:spPr>
           <a:xfrm>
-            <a:off x="1013245" y="4988107"/>
-            <a:ext cx="3895164" cy="1323301"/>
+            <a:off x="821718" y="3525896"/>
+            <a:ext cx="5343650" cy="2362337"/>
           </a:xfrm>
           <a:prstGeom prst="rect">
             <a:avLst/>
           </a:prstGeom>
         </p:spPr>
       </p:pic>
-    </p:spTree>
-    <p:extLst>
-      <p:ext uri="{BB962C8B-B14F-4D97-AF65-F5344CB8AC3E}">
-        <p14:creationId xmlns:p14="http://schemas.microsoft.com/office/powerpoint/2010/main" val="2730915760"/>
-      </p:ext>
-    </p:extLst>
-  </p:cSld>
-  <p:clrMapOvr>
-    <a:masterClrMapping/>
-  </p:clrMapOvr>
-</p:sld>
-</file>
-
-<file path=ppt/slides/slide7.xml><?xml version="1.0" encoding="utf-8"?>
-<p:sld xmlns:a="http://schemas.openxmlformats.org/drawingml/2006/main" xmlns:r="http://schemas.openxmlformats.org/officeDocument/2006/relationships" xmlns:p="http://schemas.openxmlformats.org/presentationml/2006/main">
-  <p:cSld>
-    <p:spTree>
-      <p:nvGrpSpPr>
-        <p:cNvPr id="1" name=""/>
-        <p:cNvGrpSpPr/>
-        <p:nvPr/>
-      </p:nvGrpSpPr>
-      <p:grpSpPr>
-        <a:xfrm>
-          <a:off x="0" y="0"/>
-          <a:ext cx="0" cy="0"/>
-          <a:chOff x="0" y="0"/>
-          <a:chExt cx="0" cy="0"/>
-        </a:xfrm>
-      </p:grpSpPr>
-      <p:sp>
-        <p:nvSpPr>
-          <p:cNvPr id="2" name="Título 1">
-            <a:extLst>
-              <a:ext uri="{FF2B5EF4-FFF2-40B4-BE49-F238E27FC236}">
-                <a16:creationId xmlns:a16="http://schemas.microsoft.com/office/drawing/2014/main" id="{FBB01069-074F-AF35-AAF9-00C4260CFF47}"/>
-              </a:ext>
-            </a:extLst>
-          </p:cNvPr>
-          <p:cNvSpPr>
-            <a:spLocks noGrp="1"/>
-          </p:cNvSpPr>
-          <p:nvPr>
-            <p:ph type="title"/>
-          </p:nvPr>
+      <p:sp>
+        <p:nvSpPr>
+          <p:cNvPr id="16" name="CuadroTexto 15">
+            <a:extLst>
+              <a:ext uri="{FF2B5EF4-FFF2-40B4-BE49-F238E27FC236}">
+                <a16:creationId xmlns:a16="http://schemas.microsoft.com/office/drawing/2014/main" id="{1C5F3CDA-C698-6FD9-61E6-FEAF33F26DF7}"/>
+              </a:ext>
+            </a:extLst>
+          </p:cNvPr>
+          <p:cNvSpPr txBox="1"/>
+          <p:nvPr/>
         </p:nvSpPr>
         <p:spPr>
           <a:xfrm>
-            <a:off x="975360" y="795528"/>
-            <a:ext cx="10241280" cy="528775"/>
-          </a:xfrm>
-        </p:spPr>
-        <p:txBody>
-          <a:bodyPr>
-            <a:normAutofit fontScale="90000"/>
+            <a:off x="7291551" y="2855630"/>
+            <a:ext cx="3542511" cy="369332"/>
+          </a:xfrm>
+          <a:prstGeom prst="rect">
+            <a:avLst/>
+          </a:prstGeom>
+          <a:noFill/>
+        </p:spPr>
+        <p:txBody>
+          <a:bodyPr wrap="square">
+            <a:spAutoFit/>
           </a:bodyPr>
           <a:lstStyle/>
           <a:p>
             <a:r>
+              <a:rPr lang="es-ES" dirty="0">
+                <a:hlinkClick r:id="rId4"/>
+              </a:rPr>
+              <a:t>https://github.com/txusser/Anapyce</a:t>
+            </a:r>
+            <a:r>
               <a:rPr lang="es-ES" dirty="0"/>
-              <a:t>NORMALIZACIÓN EN INTENSIDAD</a:t>
+              <a:t> </a:t>
             </a:r>
           </a:p>
         </p:txBody>
       </p:sp>
       <p:pic>
         <p:nvPicPr>
-          <p:cNvPr id="11" name="Imagen 10" descr="Imagen que contiene gato&#10;&#10;Descripción generada automáticamente">
-            <a:extLst>
-              <a:ext uri="{FF2B5EF4-FFF2-40B4-BE49-F238E27FC236}">
-                <a16:creationId xmlns:a16="http://schemas.microsoft.com/office/drawing/2014/main" id="{702D8554-DB7D-201C-3916-1A6E9260F4D6}"/>
+          <p:cNvPr id="22" name="Imagen 21">
+            <a:extLst>
+              <a:ext uri="{FF2B5EF4-FFF2-40B4-BE49-F238E27FC236}">
+                <a16:creationId xmlns:a16="http://schemas.microsoft.com/office/drawing/2014/main" id="{A0A08FC6-AAD4-C651-3A28-B8B4A1D47274}"/>
               </a:ext>
             </a:extLst>
           </p:cNvPr>
@@ -12689,21 +12053,15 @@
           <p:nvPr/>
         </p:nvPicPr>
         <p:blipFill>
-          <a:blip r:embed="rId2">
-            <a:extLst>
-              <a:ext uri="{28A0092B-C50C-407E-A947-70E740481C1C}">
-                <a14:useLocalDpi xmlns:a14="http://schemas.microsoft.com/office/drawing/2010/main" val="0"/>
-              </a:ext>
-            </a:extLst>
-          </a:blip>
+          <a:blip r:embed="rId5"/>
           <a:stretch>
             <a:fillRect/>
           </a:stretch>
         </p:blipFill>
         <p:spPr>
           <a:xfrm>
-            <a:off x="975360" y="3889742"/>
-            <a:ext cx="9049173" cy="2071025"/>
+            <a:off x="7137754" y="3421117"/>
+            <a:ext cx="3850104" cy="2689799"/>
           </a:xfrm>
           <a:prstGeom prst="rect">
             <a:avLst/>
@@ -12712,10 +12070,10 @@
       </p:pic>
       <p:sp>
         <p:nvSpPr>
-          <p:cNvPr id="12" name="30 Rectángulo">
-            <a:extLst>
-              <a:ext uri="{FF2B5EF4-FFF2-40B4-BE49-F238E27FC236}">
-                <a16:creationId xmlns:a16="http://schemas.microsoft.com/office/drawing/2014/main" id="{0B96D15C-AAFE-A0B9-CDD9-935D924EF3FC}"/>
+          <p:cNvPr id="23" name="Rectángulo 22">
+            <a:extLst>
+              <a:ext uri="{FF2B5EF4-FFF2-40B4-BE49-F238E27FC236}">
+                <a16:creationId xmlns:a16="http://schemas.microsoft.com/office/drawing/2014/main" id="{4B532AB5-C1F9-D418-258C-D92FB0CC9DD1}"/>
               </a:ext>
             </a:extLst>
           </p:cNvPr>
@@ -12724,12 +12082,67 @@
         </p:nvSpPr>
         <p:spPr>
           <a:xfrm>
-            <a:off x="2032000" y="1618525"/>
-            <a:ext cx="7992533" cy="2416046"/>
+            <a:off x="7342001" y="5801710"/>
+            <a:ext cx="635351" cy="239636"/>
           </a:xfrm>
           <a:prstGeom prst="rect">
             <a:avLst/>
           </a:prstGeom>
+          <a:noFill/>
+          <a:ln w="28575" cap="flat" cmpd="sng" algn="ctr">
+            <a:solidFill>
+              <a:schemeClr val="accent2"/>
+            </a:solidFill>
+            <a:prstDash val="solid"/>
+            <a:round/>
+            <a:headEnd type="none" w="med" len="med"/>
+            <a:tailEnd type="none" w="med" len="med"/>
+          </a:ln>
+        </p:spPr>
+        <p:style>
+          <a:lnRef idx="0">
+            <a:scrgbClr r="0" g="0" b="0"/>
+          </a:lnRef>
+          <a:fillRef idx="0">
+            <a:scrgbClr r="0" g="0" b="0"/>
+          </a:fillRef>
+          <a:effectRef idx="0">
+            <a:scrgbClr r="0" g="0" b="0"/>
+          </a:effectRef>
+          <a:fontRef idx="minor">
+            <a:schemeClr val="accent2"/>
+          </a:fontRef>
+        </p:style>
+        <p:txBody>
+          <a:bodyPr rtlCol="0" anchor="ctr"/>
+          <a:lstStyle/>
+          <a:p>
+            <a:pPr algn="ctr"/>
+            <a:endParaRPr lang="es-ES"/>
+          </a:p>
+        </p:txBody>
+      </p:sp>
+      <p:sp>
+        <p:nvSpPr>
+          <p:cNvPr id="25" name="CuadroTexto 24">
+            <a:extLst>
+              <a:ext uri="{FF2B5EF4-FFF2-40B4-BE49-F238E27FC236}">
+                <a16:creationId xmlns:a16="http://schemas.microsoft.com/office/drawing/2014/main" id="{AD33ED7E-8767-5A04-D762-F50A30C423AE}"/>
+              </a:ext>
+            </a:extLst>
+          </p:cNvPr>
+          <p:cNvSpPr txBox="1"/>
+          <p:nvPr/>
+        </p:nvSpPr>
+        <p:spPr>
+          <a:xfrm>
+            <a:off x="2122543" y="2864426"/>
+            <a:ext cx="2603263" cy="369332"/>
+          </a:xfrm>
+          <a:prstGeom prst="rect">
+            <a:avLst/>
+          </a:prstGeom>
+          <a:noFill/>
         </p:spPr>
         <p:txBody>
           <a:bodyPr wrap="square">
@@ -12737,187 +12150,23 @@
           </a:bodyPr>
           <a:lstStyle/>
           <a:p>
-            <a:pPr>
-              <a:spcAft>
-                <a:spcPts val="600"/>
-              </a:spcAft>
-            </a:pPr>
-            <a:r>
-              <a:rPr lang="es-ES" altLang="es-ES" sz="1400" b="1" dirty="0">
-                <a:solidFill>
-                  <a:srgbClr val="002060"/>
-                </a:solidFill>
+            <a:r>
+              <a:rPr lang="es-ES" dirty="0">
+                <a:hlinkClick r:id="rId6"/>
               </a:rPr>
-              <a:t>Selección de una región de referencia </a:t>
-            </a:r>
-          </a:p>
-          <a:p>
-            <a:pPr>
-              <a:spcAft>
-                <a:spcPts val="600"/>
-              </a:spcAft>
-            </a:pPr>
-            <a:r>
-              <a:rPr lang="es-ES" altLang="es-ES" sz="1400" dirty="0">
-                <a:solidFill>
-                  <a:srgbClr val="002060"/>
-                </a:solidFill>
-              </a:rPr>
-              <a:t>Si decidimos utilizar una región de referencia, el </a:t>
-            </a:r>
-            <a:r>
-              <a:rPr lang="es-ES" altLang="es-ES" sz="1400" dirty="0" err="1">
-                <a:solidFill>
-                  <a:srgbClr val="002060"/>
-                </a:solidFill>
-              </a:rPr>
-              <a:t>pons</a:t>
-            </a:r>
-            <a:r>
-              <a:rPr lang="es-ES" altLang="es-ES" sz="1400" dirty="0">
-                <a:solidFill>
-                  <a:srgbClr val="002060"/>
-                </a:solidFill>
-              </a:rPr>
-              <a:t> suele ser una buena región de referencia para la mayoría de enfermedades neurodegenerativas (FDG). Su segmentación no es sencilla, aunque FreeSurfer tiene una herramienta dedicada para realizar esta segmentación: </a:t>
-            </a:r>
-            <a:r>
-              <a:rPr lang="es-ES" altLang="es-ES" sz="1400" dirty="0">
-                <a:solidFill>
-                  <a:srgbClr val="002060"/>
-                </a:solidFill>
-                <a:hlinkClick r:id="rId3"/>
-              </a:rPr>
-              <a:t>https://surfer.nmr.mgh.harvard.edu/fswiki/BrainstemSubstructures</a:t>
-            </a:r>
-            <a:r>
-              <a:rPr lang="es-ES" altLang="es-ES" sz="1400" dirty="0">
-                <a:solidFill>
-                  <a:srgbClr val="002060"/>
-                </a:solidFill>
-              </a:rPr>
-              <a:t>  </a:t>
-            </a:r>
-          </a:p>
-          <a:p>
-            <a:pPr marL="285750" indent="-285750">
-              <a:spcAft>
-                <a:spcPts val="600"/>
-              </a:spcAft>
-              <a:buFont typeface="Arial" panose="020B0604020202020204" pitchFamily="34" charset="0"/>
-              <a:buChar char="•"/>
-            </a:pPr>
-            <a:r>
-              <a:rPr lang="es-ES" altLang="es-ES" sz="1400" dirty="0">
-                <a:solidFill>
-                  <a:srgbClr val="002060"/>
-                </a:solidFill>
-              </a:rPr>
-              <a:t>GM </a:t>
-            </a:r>
-            <a:r>
-              <a:rPr lang="es-ES" altLang="es-ES" sz="1400" dirty="0" err="1">
-                <a:solidFill>
-                  <a:srgbClr val="002060"/>
-                </a:solidFill>
-              </a:rPr>
-              <a:t>cerebellum</a:t>
-            </a:r>
-            <a:r>
-              <a:rPr lang="es-ES" altLang="es-ES" sz="1400" dirty="0">
-                <a:solidFill>
-                  <a:srgbClr val="002060"/>
-                </a:solidFill>
-              </a:rPr>
-              <a:t> o </a:t>
-            </a:r>
-            <a:r>
-              <a:rPr lang="es-ES" altLang="es-ES" sz="1400" dirty="0" err="1">
-                <a:solidFill>
-                  <a:srgbClr val="002060"/>
-                </a:solidFill>
-              </a:rPr>
-              <a:t>whole</a:t>
-            </a:r>
-            <a:r>
-              <a:rPr lang="es-ES" altLang="es-ES" sz="1400" dirty="0">
-                <a:solidFill>
-                  <a:srgbClr val="002060"/>
-                </a:solidFill>
-              </a:rPr>
+              <a:t>https://github.com/spm</a:t>
+            </a:r>
+            <a:r>
+              <a:rPr lang="es-ES" dirty="0"/>
               <a:t> </a:t>
             </a:r>
-            <a:r>
-              <a:rPr lang="es-ES" altLang="es-ES" sz="1400" dirty="0" err="1">
-                <a:solidFill>
-                  <a:srgbClr val="002060"/>
-                </a:solidFill>
-              </a:rPr>
-              <a:t>cerebellum</a:t>
-            </a:r>
-            <a:r>
-              <a:rPr lang="es-ES" altLang="es-ES" sz="1400" dirty="0">
-                <a:solidFill>
-                  <a:srgbClr val="002060"/>
-                </a:solidFill>
-              </a:rPr>
-              <a:t> para PET amiloide</a:t>
-            </a:r>
-          </a:p>
-          <a:p>
-            <a:pPr marL="285750" indent="-285750">
-              <a:spcAft>
-                <a:spcPts val="600"/>
-              </a:spcAft>
-              <a:buFont typeface="Arial" panose="020B0604020202020204" pitchFamily="34" charset="0"/>
-              <a:buChar char="•"/>
-            </a:pPr>
-            <a:r>
-              <a:rPr lang="es-ES" altLang="es-ES" sz="1400" dirty="0">
-                <a:solidFill>
-                  <a:srgbClr val="002060"/>
-                </a:solidFill>
-              </a:rPr>
-              <a:t>Parte baja del cerebelo para tau PET</a:t>
-            </a:r>
-          </a:p>
-          <a:p>
-            <a:pPr marL="285750" indent="-285750">
-              <a:spcAft>
-                <a:spcPts val="600"/>
-              </a:spcAft>
-              <a:buFont typeface="Arial" panose="020B0604020202020204" pitchFamily="34" charset="0"/>
-              <a:buChar char="•"/>
-            </a:pPr>
-            <a:r>
-              <a:rPr lang="es-ES" altLang="es-ES" sz="1400" dirty="0">
-                <a:solidFill>
-                  <a:srgbClr val="002060"/>
-                </a:solidFill>
-              </a:rPr>
-              <a:t>Parte posterior del cerebelo para DOPA-PET</a:t>
-            </a:r>
-          </a:p>
-          <a:p>
-            <a:pPr marL="285750" indent="-285750">
-              <a:spcAft>
-                <a:spcPts val="600"/>
-              </a:spcAft>
-              <a:buFont typeface="Arial" panose="020B0604020202020204" pitchFamily="34" charset="0"/>
-              <a:buChar char="•"/>
-            </a:pPr>
-            <a:endParaRPr lang="es-ES_tradnl" altLang="es-ES" sz="1400" dirty="0">
-              <a:solidFill>
-                <a:srgbClr val="002060"/>
-              </a:solidFill>
-            </a:endParaRPr>
           </a:p>
         </p:txBody>
       </p:sp>
     </p:spTree>
     <p:extLst>
       <p:ext uri="{BB962C8B-B14F-4D97-AF65-F5344CB8AC3E}">
-        <p14:creationId xmlns:p14="http://schemas.microsoft.com/office/powerpoint/2010/main" val="969523198"/>
+        <p14:creationId xmlns:p14="http://schemas.microsoft.com/office/powerpoint/2010/main" val="2269543595"/>
       </p:ext>
     </p:extLst>
   </p:cSld>

</xml_diff>